<commit_message>
Presentation finale MAC & ARP + topologie
</commit_message>
<xml_diff>
--- a/networking/arp_mac/presentation.pptx
+++ b/networking/arp_mac/presentation.pptx
@@ -5,7 +5,7 @@
     <p:sldMasterId id="2147483672" r:id="rId1"/>
   </p:sldMasterIdLst>
   <p:notesMasterIdLst>
-    <p:notesMasterId r:id="rId14"/>
+    <p:notesMasterId r:id="rId13"/>
   </p:notesMasterIdLst>
   <p:sldIdLst>
     <p:sldId id="256" r:id="rId2"/>
@@ -13,13 +13,12 @@
     <p:sldId id="284" r:id="rId4"/>
     <p:sldId id="285" r:id="rId5"/>
     <p:sldId id="292" r:id="rId6"/>
-    <p:sldId id="286" r:id="rId7"/>
-    <p:sldId id="287" r:id="rId8"/>
-    <p:sldId id="283" r:id="rId9"/>
-    <p:sldId id="288" r:id="rId10"/>
-    <p:sldId id="291" r:id="rId11"/>
-    <p:sldId id="289" r:id="rId12"/>
-    <p:sldId id="290" r:id="rId13"/>
+    <p:sldId id="287" r:id="rId7"/>
+    <p:sldId id="283" r:id="rId8"/>
+    <p:sldId id="288" r:id="rId9"/>
+    <p:sldId id="291" r:id="rId10"/>
+    <p:sldId id="289" r:id="rId11"/>
+    <p:sldId id="290" r:id="rId12"/>
   </p:sldIdLst>
   <p:sldSz cx="12192000" cy="6858000"/>
   <p:notesSz cx="6858000" cy="9144000"/>
@@ -208,7 +207,7 @@
           <a:p>
             <a:fld id="{0026F1AD-A843-465D-802B-A30092236F83}" type="datetimeFigureOut">
               <a:rPr lang="fr-BE" smtClean="0"/>
-              <a:t>01-06-23</a:t>
+              <a:t>02-06-23</a:t>
             </a:fld>
             <a:endParaRPr lang="fr-BE"/>
           </a:p>
@@ -625,7 +624,7 @@
           <a:p>
             <a:fld id="{AC1C6612-784E-4D98-BDFE-64646C099F61}" type="datetimeFigureOut">
               <a:rPr lang="fr-BE" smtClean="0"/>
-              <a:t>01-06-23</a:t>
+              <a:t>02-06-23</a:t>
             </a:fld>
             <a:endParaRPr lang="fr-BE"/>
           </a:p>
@@ -825,7 +824,7 @@
           <a:p>
             <a:fld id="{AC1C6612-784E-4D98-BDFE-64646C099F61}" type="datetimeFigureOut">
               <a:rPr lang="fr-BE" smtClean="0"/>
-              <a:t>01-06-23</a:t>
+              <a:t>02-06-23</a:t>
             </a:fld>
             <a:endParaRPr lang="fr-BE"/>
           </a:p>
@@ -1035,7 +1034,7 @@
           <a:p>
             <a:fld id="{AC1C6612-784E-4D98-BDFE-64646C099F61}" type="datetimeFigureOut">
               <a:rPr lang="fr-BE" smtClean="0"/>
-              <a:t>01-06-23</a:t>
+              <a:t>02-06-23</a:t>
             </a:fld>
             <a:endParaRPr lang="fr-BE"/>
           </a:p>
@@ -1235,7 +1234,7 @@
           <a:p>
             <a:fld id="{AC1C6612-784E-4D98-BDFE-64646C099F61}" type="datetimeFigureOut">
               <a:rPr lang="fr-BE" smtClean="0"/>
-              <a:t>01-06-23</a:t>
+              <a:t>02-06-23</a:t>
             </a:fld>
             <a:endParaRPr lang="fr-BE"/>
           </a:p>
@@ -1511,7 +1510,7 @@
           <a:p>
             <a:fld id="{AC1C6612-784E-4D98-BDFE-64646C099F61}" type="datetimeFigureOut">
               <a:rPr lang="fr-BE" smtClean="0"/>
-              <a:t>01-06-23</a:t>
+              <a:t>02-06-23</a:t>
             </a:fld>
             <a:endParaRPr lang="fr-BE"/>
           </a:p>
@@ -1779,7 +1778,7 @@
           <a:p>
             <a:fld id="{AC1C6612-784E-4D98-BDFE-64646C099F61}" type="datetimeFigureOut">
               <a:rPr lang="fr-BE" smtClean="0"/>
-              <a:t>01-06-23</a:t>
+              <a:t>02-06-23</a:t>
             </a:fld>
             <a:endParaRPr lang="fr-BE"/>
           </a:p>
@@ -2194,7 +2193,7 @@
           <a:p>
             <a:fld id="{AC1C6612-784E-4D98-BDFE-64646C099F61}" type="datetimeFigureOut">
               <a:rPr lang="fr-BE" smtClean="0"/>
-              <a:t>01-06-23</a:t>
+              <a:t>02-06-23</a:t>
             </a:fld>
             <a:endParaRPr lang="fr-BE"/>
           </a:p>
@@ -2336,7 +2335,7 @@
           <a:p>
             <a:fld id="{AC1C6612-784E-4D98-BDFE-64646C099F61}" type="datetimeFigureOut">
               <a:rPr lang="fr-BE" smtClean="0"/>
-              <a:t>01-06-23</a:t>
+              <a:t>02-06-23</a:t>
             </a:fld>
             <a:endParaRPr lang="fr-BE"/>
           </a:p>
@@ -2449,7 +2448,7 @@
           <a:p>
             <a:fld id="{AC1C6612-784E-4D98-BDFE-64646C099F61}" type="datetimeFigureOut">
               <a:rPr lang="fr-BE" smtClean="0"/>
-              <a:t>01-06-23</a:t>
+              <a:t>02-06-23</a:t>
             </a:fld>
             <a:endParaRPr lang="fr-BE"/>
           </a:p>
@@ -2762,7 +2761,7 @@
           <a:p>
             <a:fld id="{AC1C6612-784E-4D98-BDFE-64646C099F61}" type="datetimeFigureOut">
               <a:rPr lang="fr-BE" smtClean="0"/>
-              <a:t>01-06-23</a:t>
+              <a:t>02-06-23</a:t>
             </a:fld>
             <a:endParaRPr lang="fr-BE"/>
           </a:p>
@@ -3055,7 +3054,7 @@
           <a:p>
             <a:fld id="{AC1C6612-784E-4D98-BDFE-64646C099F61}" type="datetimeFigureOut">
               <a:rPr lang="fr-BE" smtClean="0"/>
-              <a:t>01-06-23</a:t>
+              <a:t>02-06-23</a:t>
             </a:fld>
             <a:endParaRPr lang="fr-BE"/>
           </a:p>
@@ -3298,7 +3297,7 @@
           <a:p>
             <a:fld id="{AC1C6612-784E-4D98-BDFE-64646C099F61}" type="datetimeFigureOut">
               <a:rPr lang="fr-BE" smtClean="0"/>
-              <a:t>01-06-23</a:t>
+              <a:t>02-06-23</a:t>
             </a:fld>
             <a:endParaRPr lang="fr-BE"/>
           </a:p>
@@ -4135,579 +4134,6 @@
           <a:prstGeom prst="rect">
             <a:avLst/>
           </a:prstGeom>
-        </p:spPr>
-      </p:pic>
-      <p:sp>
-        <p:nvSpPr>
-          <p:cNvPr id="2" name="Titre 1">
-            <a:extLst>
-              <a:ext uri="{FF2B5EF4-FFF2-40B4-BE49-F238E27FC236}">
-                <a16:creationId xmlns:a16="http://schemas.microsoft.com/office/drawing/2014/main" id="{6C7DAD02-B469-E9EF-B4D5-EC9AD3F3ECCB}"/>
-              </a:ext>
-            </a:extLst>
-          </p:cNvPr>
-          <p:cNvSpPr txBox="1">
-            <a:spLocks/>
-          </p:cNvSpPr>
-          <p:nvPr/>
-        </p:nvSpPr>
-        <p:spPr>
-          <a:xfrm>
-            <a:off x="1346200" y="484836"/>
-            <a:ext cx="10515600" cy="1325563"/>
-          </a:xfrm>
-          <a:prstGeom prst="rect">
-            <a:avLst/>
-          </a:prstGeom>
-        </p:spPr>
-        <p:txBody>
-          <a:bodyPr vert="horz" lIns="91440" tIns="45720" rIns="91440" bIns="45720" rtlCol="0" anchor="b">
-            <a:normAutofit fontScale="92500" lnSpcReduction="10000"/>
-          </a:bodyPr>
-          <a:lstStyle>
-            <a:lvl1pPr algn="ctr" defTabSz="914400" rtl="0" eaLnBrk="1" latinLnBrk="0" hangingPunct="1">
-              <a:lnSpc>
-                <a:spcPct val="90000"/>
-              </a:lnSpc>
-              <a:spcBef>
-                <a:spcPct val="0"/>
-              </a:spcBef>
-              <a:buNone/>
-              <a:defRPr sz="6000" kern="1200">
-                <a:solidFill>
-                  <a:schemeClr val="tx1"/>
-                </a:solidFill>
-                <a:latin typeface="+mj-lt"/>
-                <a:ea typeface="+mj-ea"/>
-                <a:cs typeface="+mj-cs"/>
-              </a:defRPr>
-            </a:lvl1pPr>
-          </a:lstStyle>
-          <a:p>
-            <a:r>
-              <a:rPr lang="fr-FR" sz="5400" dirty="0">
-                <a:ln w="38100">
-                  <a:solidFill>
-                    <a:schemeClr val="tx1"/>
-                  </a:solidFill>
-                </a:ln>
-                <a:solidFill>
-                  <a:srgbClr val="FF0000"/>
-                </a:solidFill>
-                <a:latin typeface="Open Sans ExtraBold" panose="020B0906030804020204" pitchFamily="34" charset="0"/>
-                <a:ea typeface="Open Sans ExtraBold" panose="020B0906030804020204" pitchFamily="34" charset="0"/>
-                <a:cs typeface="Open Sans ExtraBold" panose="020B0906030804020204" pitchFamily="34" charset="0"/>
-              </a:rPr>
-              <a:t>ARP</a:t>
-            </a:r>
-          </a:p>
-          <a:p>
-            <a:r>
-              <a:rPr lang="fr-FR" sz="5400" dirty="0" err="1">
-                <a:ln w="38100">
-                  <a:solidFill>
-                    <a:schemeClr val="tx1"/>
-                  </a:solidFill>
-                </a:ln>
-                <a:solidFill>
-                  <a:srgbClr val="FF0000"/>
-                </a:solidFill>
-                <a:latin typeface="Open Sans ExtraBold" panose="020B0906030804020204" pitchFamily="34" charset="0"/>
-                <a:ea typeface="Open Sans ExtraBold" panose="020B0906030804020204" pitchFamily="34" charset="0"/>
-                <a:cs typeface="Open Sans ExtraBold" panose="020B0906030804020204" pitchFamily="34" charset="0"/>
-              </a:rPr>
-              <a:t>Address</a:t>
-            </a:r>
-            <a:r>
-              <a:rPr lang="fr-FR" sz="5400" dirty="0">
-                <a:ln w="38100">
-                  <a:solidFill>
-                    <a:schemeClr val="tx1"/>
-                  </a:solidFill>
-                </a:ln>
-                <a:solidFill>
-                  <a:srgbClr val="FF0000"/>
-                </a:solidFill>
-                <a:latin typeface="Open Sans ExtraBold" panose="020B0906030804020204" pitchFamily="34" charset="0"/>
-                <a:ea typeface="Open Sans ExtraBold" panose="020B0906030804020204" pitchFamily="34" charset="0"/>
-                <a:cs typeface="Open Sans ExtraBold" panose="020B0906030804020204" pitchFamily="34" charset="0"/>
-              </a:rPr>
-              <a:t> </a:t>
-            </a:r>
-            <a:r>
-              <a:rPr lang="fr-FR" sz="5400" dirty="0" err="1">
-                <a:ln w="38100">
-                  <a:solidFill>
-                    <a:schemeClr val="tx1"/>
-                  </a:solidFill>
-                </a:ln>
-                <a:solidFill>
-                  <a:srgbClr val="FF0000"/>
-                </a:solidFill>
-                <a:latin typeface="Open Sans ExtraBold" panose="020B0906030804020204" pitchFamily="34" charset="0"/>
-                <a:ea typeface="Open Sans ExtraBold" panose="020B0906030804020204" pitchFamily="34" charset="0"/>
-                <a:cs typeface="Open Sans ExtraBold" panose="020B0906030804020204" pitchFamily="34" charset="0"/>
-              </a:rPr>
-              <a:t>Resolution</a:t>
-            </a:r>
-            <a:r>
-              <a:rPr lang="fr-FR" sz="5400" dirty="0">
-                <a:ln w="38100">
-                  <a:solidFill>
-                    <a:schemeClr val="tx1"/>
-                  </a:solidFill>
-                </a:ln>
-                <a:solidFill>
-                  <a:srgbClr val="FF0000"/>
-                </a:solidFill>
-                <a:latin typeface="Open Sans ExtraBold" panose="020B0906030804020204" pitchFamily="34" charset="0"/>
-                <a:ea typeface="Open Sans ExtraBold" panose="020B0906030804020204" pitchFamily="34" charset="0"/>
-                <a:cs typeface="Open Sans ExtraBold" panose="020B0906030804020204" pitchFamily="34" charset="0"/>
-              </a:rPr>
-              <a:t> Protocol</a:t>
-            </a:r>
-            <a:endParaRPr lang="fr-BE" sz="5400" dirty="0">
-              <a:ln w="38100">
-                <a:solidFill>
-                  <a:schemeClr val="tx1"/>
-                </a:solidFill>
-              </a:ln>
-              <a:solidFill>
-                <a:srgbClr val="FF0000"/>
-              </a:solidFill>
-              <a:latin typeface="Open Sans ExtraBold" panose="020B0906030804020204" pitchFamily="34" charset="0"/>
-              <a:ea typeface="Open Sans ExtraBold" panose="020B0906030804020204" pitchFamily="34" charset="0"/>
-              <a:cs typeface="Open Sans ExtraBold" panose="020B0906030804020204" pitchFamily="34" charset="0"/>
-            </a:endParaRPr>
-          </a:p>
-        </p:txBody>
-      </p:sp>
-      <p:sp>
-        <p:nvSpPr>
-          <p:cNvPr id="8" name="Sous-titre 10">
-            <a:extLst>
-              <a:ext uri="{FF2B5EF4-FFF2-40B4-BE49-F238E27FC236}">
-                <a16:creationId xmlns:a16="http://schemas.microsoft.com/office/drawing/2014/main" id="{D969A3C9-3CAC-705D-DD59-BD35327CB7B0}"/>
-              </a:ext>
-            </a:extLst>
-          </p:cNvPr>
-          <p:cNvSpPr txBox="1">
-            <a:spLocks/>
-          </p:cNvSpPr>
-          <p:nvPr/>
-        </p:nvSpPr>
-        <p:spPr>
-          <a:xfrm>
-            <a:off x="838200" y="2618581"/>
-            <a:ext cx="10734964" cy="3431237"/>
-          </a:xfrm>
-          <a:prstGeom prst="rect">
-            <a:avLst/>
-          </a:prstGeom>
-        </p:spPr>
-        <p:txBody>
-          <a:bodyPr vert="horz" lIns="91440" tIns="45720" rIns="91440" bIns="45720" rtlCol="0">
-            <a:normAutofit/>
-          </a:bodyPr>
-          <a:lstStyle>
-            <a:lvl1pPr marL="0" indent="0" algn="ctr" defTabSz="914400" rtl="0" eaLnBrk="1" latinLnBrk="0" hangingPunct="1">
-              <a:lnSpc>
-                <a:spcPct val="90000"/>
-              </a:lnSpc>
-              <a:spcBef>
-                <a:spcPts val="1000"/>
-              </a:spcBef>
-              <a:buFont typeface="Arial" panose="020B0604020202020204" pitchFamily="34" charset="0"/>
-              <a:buNone/>
-              <a:defRPr sz="2400" kern="1200">
-                <a:solidFill>
-                  <a:schemeClr val="tx1"/>
-                </a:solidFill>
-                <a:latin typeface="+mn-lt"/>
-                <a:ea typeface="+mn-ea"/>
-                <a:cs typeface="+mn-cs"/>
-              </a:defRPr>
-            </a:lvl1pPr>
-            <a:lvl2pPr marL="457200" indent="0" algn="ctr" defTabSz="914400" rtl="0" eaLnBrk="1" latinLnBrk="0" hangingPunct="1">
-              <a:lnSpc>
-                <a:spcPct val="90000"/>
-              </a:lnSpc>
-              <a:spcBef>
-                <a:spcPts val="500"/>
-              </a:spcBef>
-              <a:buFont typeface="Arial" panose="020B0604020202020204" pitchFamily="34" charset="0"/>
-              <a:buNone/>
-              <a:defRPr sz="2000" kern="1200">
-                <a:solidFill>
-                  <a:schemeClr val="tx1"/>
-                </a:solidFill>
-                <a:latin typeface="+mn-lt"/>
-                <a:ea typeface="+mn-ea"/>
-                <a:cs typeface="+mn-cs"/>
-              </a:defRPr>
-            </a:lvl2pPr>
-            <a:lvl3pPr marL="914400" indent="0" algn="ctr" defTabSz="914400" rtl="0" eaLnBrk="1" latinLnBrk="0" hangingPunct="1">
-              <a:lnSpc>
-                <a:spcPct val="90000"/>
-              </a:lnSpc>
-              <a:spcBef>
-                <a:spcPts val="500"/>
-              </a:spcBef>
-              <a:buFont typeface="Arial" panose="020B0604020202020204" pitchFamily="34" charset="0"/>
-              <a:buNone/>
-              <a:defRPr sz="1800" kern="1200">
-                <a:solidFill>
-                  <a:schemeClr val="tx1"/>
-                </a:solidFill>
-                <a:latin typeface="+mn-lt"/>
-                <a:ea typeface="+mn-ea"/>
-                <a:cs typeface="+mn-cs"/>
-              </a:defRPr>
-            </a:lvl3pPr>
-            <a:lvl4pPr marL="1371600" indent="0" algn="ctr" defTabSz="914400" rtl="0" eaLnBrk="1" latinLnBrk="0" hangingPunct="1">
-              <a:lnSpc>
-                <a:spcPct val="90000"/>
-              </a:lnSpc>
-              <a:spcBef>
-                <a:spcPts val="500"/>
-              </a:spcBef>
-              <a:buFont typeface="Arial" panose="020B0604020202020204" pitchFamily="34" charset="0"/>
-              <a:buNone/>
-              <a:defRPr sz="1600" kern="1200">
-                <a:solidFill>
-                  <a:schemeClr val="tx1"/>
-                </a:solidFill>
-                <a:latin typeface="+mn-lt"/>
-                <a:ea typeface="+mn-ea"/>
-                <a:cs typeface="+mn-cs"/>
-              </a:defRPr>
-            </a:lvl4pPr>
-            <a:lvl5pPr marL="1828800" indent="0" algn="ctr" defTabSz="914400" rtl="0" eaLnBrk="1" latinLnBrk="0" hangingPunct="1">
-              <a:lnSpc>
-                <a:spcPct val="90000"/>
-              </a:lnSpc>
-              <a:spcBef>
-                <a:spcPts val="500"/>
-              </a:spcBef>
-              <a:buFont typeface="Arial" panose="020B0604020202020204" pitchFamily="34" charset="0"/>
-              <a:buNone/>
-              <a:defRPr sz="1600" kern="1200">
-                <a:solidFill>
-                  <a:schemeClr val="tx1"/>
-                </a:solidFill>
-                <a:latin typeface="+mn-lt"/>
-                <a:ea typeface="+mn-ea"/>
-                <a:cs typeface="+mn-cs"/>
-              </a:defRPr>
-            </a:lvl5pPr>
-            <a:lvl6pPr marL="2286000" indent="0" algn="ctr" defTabSz="914400" rtl="0" eaLnBrk="1" latinLnBrk="0" hangingPunct="1">
-              <a:lnSpc>
-                <a:spcPct val="90000"/>
-              </a:lnSpc>
-              <a:spcBef>
-                <a:spcPts val="500"/>
-              </a:spcBef>
-              <a:buFont typeface="Arial" panose="020B0604020202020204" pitchFamily="34" charset="0"/>
-              <a:buNone/>
-              <a:defRPr sz="1600" kern="1200">
-                <a:solidFill>
-                  <a:schemeClr val="tx1"/>
-                </a:solidFill>
-                <a:latin typeface="+mn-lt"/>
-                <a:ea typeface="+mn-ea"/>
-                <a:cs typeface="+mn-cs"/>
-              </a:defRPr>
-            </a:lvl6pPr>
-            <a:lvl7pPr marL="2743200" indent="0" algn="ctr" defTabSz="914400" rtl="0" eaLnBrk="1" latinLnBrk="0" hangingPunct="1">
-              <a:lnSpc>
-                <a:spcPct val="90000"/>
-              </a:lnSpc>
-              <a:spcBef>
-                <a:spcPts val="500"/>
-              </a:spcBef>
-              <a:buFont typeface="Arial" panose="020B0604020202020204" pitchFamily="34" charset="0"/>
-              <a:buNone/>
-              <a:defRPr sz="1600" kern="1200">
-                <a:solidFill>
-                  <a:schemeClr val="tx1"/>
-                </a:solidFill>
-                <a:latin typeface="+mn-lt"/>
-                <a:ea typeface="+mn-ea"/>
-                <a:cs typeface="+mn-cs"/>
-              </a:defRPr>
-            </a:lvl7pPr>
-            <a:lvl8pPr marL="3200400" indent="0" algn="ctr" defTabSz="914400" rtl="0" eaLnBrk="1" latinLnBrk="0" hangingPunct="1">
-              <a:lnSpc>
-                <a:spcPct val="90000"/>
-              </a:lnSpc>
-              <a:spcBef>
-                <a:spcPts val="500"/>
-              </a:spcBef>
-              <a:buFont typeface="Arial" panose="020B0604020202020204" pitchFamily="34" charset="0"/>
-              <a:buNone/>
-              <a:defRPr sz="1600" kern="1200">
-                <a:solidFill>
-                  <a:schemeClr val="tx1"/>
-                </a:solidFill>
-                <a:latin typeface="+mn-lt"/>
-                <a:ea typeface="+mn-ea"/>
-                <a:cs typeface="+mn-cs"/>
-              </a:defRPr>
-            </a:lvl8pPr>
-            <a:lvl9pPr marL="3657600" indent="0" algn="ctr" defTabSz="914400" rtl="0" eaLnBrk="1" latinLnBrk="0" hangingPunct="1">
-              <a:lnSpc>
-                <a:spcPct val="90000"/>
-              </a:lnSpc>
-              <a:spcBef>
-                <a:spcPts val="500"/>
-              </a:spcBef>
-              <a:buFont typeface="Arial" panose="020B0604020202020204" pitchFamily="34" charset="0"/>
-              <a:buNone/>
-              <a:defRPr sz="1600" kern="1200">
-                <a:solidFill>
-                  <a:schemeClr val="tx1"/>
-                </a:solidFill>
-                <a:latin typeface="+mn-lt"/>
-                <a:ea typeface="+mn-ea"/>
-                <a:cs typeface="+mn-cs"/>
-              </a:defRPr>
-            </a:lvl9pPr>
-          </a:lstStyle>
-          <a:p>
-            <a:pPr marL="342900" indent="-342900" algn="l">
-              <a:buFont typeface="Arial" panose="020B0604020202020204" pitchFamily="34" charset="0"/>
-              <a:buChar char="•"/>
-            </a:pPr>
-            <a:r>
-              <a:rPr lang="fr-FR" sz="2800" dirty="0">
-                <a:ln w="28575">
-                  <a:solidFill>
-                    <a:sysClr val="windowText" lastClr="000000"/>
-                  </a:solidFill>
-                </a:ln>
-                <a:solidFill>
-                  <a:schemeClr val="bg1"/>
-                </a:solidFill>
-                <a:latin typeface="Open Sans ExtraBold" panose="020B0906030804020204" pitchFamily="34" charset="0"/>
-                <a:ea typeface="Open Sans ExtraBold" panose="020B0906030804020204" pitchFamily="34" charset="0"/>
-                <a:cs typeface="Open Sans ExtraBold" panose="020B0906030804020204" pitchFamily="34" charset="0"/>
-              </a:rPr>
-              <a:t>Permet d’obtenir la MAC associée à une IP</a:t>
-            </a:r>
-          </a:p>
-          <a:p>
-            <a:pPr marL="342900" indent="-342900" algn="l">
-              <a:buFont typeface="Arial" panose="020B0604020202020204" pitchFamily="34" charset="0"/>
-              <a:buChar char="•"/>
-            </a:pPr>
-            <a:r>
-              <a:rPr lang="fr-FR" sz="2800" dirty="0">
-                <a:ln w="28575">
-                  <a:solidFill>
-                    <a:sysClr val="windowText" lastClr="000000"/>
-                  </a:solidFill>
-                </a:ln>
-                <a:solidFill>
-                  <a:schemeClr val="bg1"/>
-                </a:solidFill>
-                <a:latin typeface="Open Sans ExtraBold" panose="020B0906030804020204" pitchFamily="34" charset="0"/>
-                <a:ea typeface="Open Sans ExtraBold" panose="020B0906030804020204" pitchFamily="34" charset="0"/>
-                <a:cs typeface="Open Sans ExtraBold" panose="020B0906030804020204" pitchFamily="34" charset="0"/>
-              </a:rPr>
-              <a:t>Requêtes</a:t>
-            </a:r>
-          </a:p>
-          <a:p>
-            <a:pPr marL="914400" lvl="1" indent="-457200" algn="l">
-              <a:buFont typeface="+mj-lt"/>
-              <a:buAutoNum type="arabicPeriod"/>
-            </a:pPr>
-            <a:r>
-              <a:rPr lang="fr-FR" sz="2400" dirty="0" err="1">
-                <a:ln w="28575">
-                  <a:solidFill>
-                    <a:sysClr val="windowText" lastClr="000000"/>
-                  </a:solidFill>
-                </a:ln>
-                <a:solidFill>
-                  <a:schemeClr val="bg1"/>
-                </a:solidFill>
-                <a:latin typeface="Open Sans ExtraBold" panose="020B0906030804020204" pitchFamily="34" charset="0"/>
-                <a:ea typeface="Open Sans ExtraBold" panose="020B0906030804020204" pitchFamily="34" charset="0"/>
-                <a:cs typeface="Open Sans ExtraBold" panose="020B0906030804020204" pitchFamily="34" charset="0"/>
-              </a:rPr>
-              <a:t>Request</a:t>
-            </a:r>
-            <a:r>
-              <a:rPr lang="fr-FR" sz="2400" dirty="0">
-                <a:ln w="28575">
-                  <a:solidFill>
-                    <a:sysClr val="windowText" lastClr="000000"/>
-                  </a:solidFill>
-                </a:ln>
-                <a:solidFill>
-                  <a:schemeClr val="bg1"/>
-                </a:solidFill>
-                <a:latin typeface="Open Sans ExtraBold" panose="020B0906030804020204" pitchFamily="34" charset="0"/>
-                <a:ea typeface="Open Sans ExtraBold" panose="020B0906030804020204" pitchFamily="34" charset="0"/>
-                <a:cs typeface="Open Sans ExtraBold" panose="020B0906030804020204" pitchFamily="34" charset="0"/>
-              </a:rPr>
-              <a:t> (Qui a X.X.X.X ?)</a:t>
-            </a:r>
-          </a:p>
-          <a:p>
-            <a:pPr lvl="2" algn="l"/>
-            <a:r>
-              <a:rPr lang="fr-FR" sz="2200" dirty="0">
-                <a:ln w="28575">
-                  <a:solidFill>
-                    <a:sysClr val="windowText" lastClr="000000"/>
-                  </a:solidFill>
-                </a:ln>
-                <a:solidFill>
-                  <a:schemeClr val="bg1"/>
-                </a:solidFill>
-                <a:latin typeface="Open Sans ExtraBold" panose="020B0906030804020204" pitchFamily="34" charset="0"/>
-                <a:ea typeface="Open Sans ExtraBold" panose="020B0906030804020204" pitchFamily="34" charset="0"/>
-                <a:cs typeface="Open Sans ExtraBold" panose="020B0906030804020204" pitchFamily="34" charset="0"/>
-              </a:rPr>
-              <a:t>Broadcast</a:t>
-            </a:r>
-          </a:p>
-          <a:p>
-            <a:pPr marL="914400" lvl="1" indent="-457200" algn="l">
-              <a:buFont typeface="+mj-lt"/>
-              <a:buAutoNum type="arabicPeriod"/>
-            </a:pPr>
-            <a:r>
-              <a:rPr lang="fr-FR" sz="2400" dirty="0" err="1">
-                <a:ln w="28575">
-                  <a:solidFill>
-                    <a:sysClr val="windowText" lastClr="000000"/>
-                  </a:solidFill>
-                </a:ln>
-                <a:solidFill>
-                  <a:schemeClr val="bg1"/>
-                </a:solidFill>
-                <a:latin typeface="Open Sans ExtraBold" panose="020B0906030804020204" pitchFamily="34" charset="0"/>
-                <a:ea typeface="Open Sans ExtraBold" panose="020B0906030804020204" pitchFamily="34" charset="0"/>
-                <a:cs typeface="Open Sans ExtraBold" panose="020B0906030804020204" pitchFamily="34" charset="0"/>
-              </a:rPr>
-              <a:t>Reply</a:t>
-            </a:r>
-            <a:r>
-              <a:rPr lang="fr-FR" sz="2400" dirty="0">
-                <a:ln w="28575">
-                  <a:solidFill>
-                    <a:sysClr val="windowText" lastClr="000000"/>
-                  </a:solidFill>
-                </a:ln>
-                <a:solidFill>
-                  <a:schemeClr val="bg1"/>
-                </a:solidFill>
-                <a:latin typeface="Open Sans ExtraBold" panose="020B0906030804020204" pitchFamily="34" charset="0"/>
-                <a:ea typeface="Open Sans ExtraBold" panose="020B0906030804020204" pitchFamily="34" charset="0"/>
-                <a:cs typeface="Open Sans ExtraBold" panose="020B0906030804020204" pitchFamily="34" charset="0"/>
-              </a:rPr>
-              <a:t> (C’est moi qui ai X.X.X.X, voici ma MAC: Y:Y:Y:Y:Y:Y)</a:t>
-            </a:r>
-          </a:p>
-          <a:p>
-            <a:pPr lvl="2" algn="l"/>
-            <a:r>
-              <a:rPr lang="fr-FR" sz="2200" dirty="0">
-                <a:ln w="28575">
-                  <a:solidFill>
-                    <a:sysClr val="windowText" lastClr="000000"/>
-                  </a:solidFill>
-                </a:ln>
-                <a:solidFill>
-                  <a:schemeClr val="bg1"/>
-                </a:solidFill>
-                <a:latin typeface="Open Sans ExtraBold" panose="020B0906030804020204" pitchFamily="34" charset="0"/>
-                <a:ea typeface="Open Sans ExtraBold" panose="020B0906030804020204" pitchFamily="34" charset="0"/>
-                <a:cs typeface="Open Sans ExtraBold" panose="020B0906030804020204" pitchFamily="34" charset="0"/>
-              </a:rPr>
-              <a:t>Unicast</a:t>
-            </a:r>
-          </a:p>
-        </p:txBody>
-      </p:sp>
-    </p:spTree>
-    <p:extLst>
-      <p:ext uri="{BB962C8B-B14F-4D97-AF65-F5344CB8AC3E}">
-        <p14:creationId xmlns:p14="http://schemas.microsoft.com/office/powerpoint/2010/main" val="226621067"/>
-      </p:ext>
-    </p:extLst>
-  </p:cSld>
-  <p:clrMapOvr>
-    <a:masterClrMapping/>
-  </p:clrMapOvr>
-  <mc:AlternateContent xmlns:mc="http://schemas.openxmlformats.org/markup-compatibility/2006" xmlns:p159="http://schemas.microsoft.com/office/powerpoint/2015/09/main">
-    <mc:Choice Requires="p159">
-      <p:transition xmlns:p14="http://schemas.microsoft.com/office/powerpoint/2010/main" spd="slow" p14:dur="2000">
-        <p159:morph option="byObject"/>
-      </p:transition>
-    </mc:Choice>
-    <mc:Fallback xmlns="">
-      <p:transition spd="slow">
-        <p:fade/>
-      </p:transition>
-    </mc:Fallback>
-  </mc:AlternateContent>
-</p:sld>
-</file>
-
-<file path=ppt/slides/slide11.xml><?xml version="1.0" encoding="utf-8"?>
-<p:sld xmlns:a="http://schemas.openxmlformats.org/drawingml/2006/main" xmlns:r="http://schemas.openxmlformats.org/officeDocument/2006/relationships" xmlns:p="http://schemas.openxmlformats.org/presentationml/2006/main">
-  <p:cSld>
-    <p:spTree>
-      <p:nvGrpSpPr>
-        <p:cNvPr id="1" name=""/>
-        <p:cNvGrpSpPr/>
-        <p:nvPr/>
-      </p:nvGrpSpPr>
-      <p:grpSpPr>
-        <a:xfrm>
-          <a:off x="0" y="0"/>
-          <a:ext cx="0" cy="0"/>
-          <a:chOff x="0" y="0"/>
-          <a:chExt cx="0" cy="0"/>
-        </a:xfrm>
-      </p:grpSpPr>
-      <p:pic>
-        <p:nvPicPr>
-          <p:cNvPr id="5" name="Image 4">
-            <a:extLst>
-              <a:ext uri="{FF2B5EF4-FFF2-40B4-BE49-F238E27FC236}">
-                <a16:creationId xmlns:a16="http://schemas.microsoft.com/office/drawing/2014/main" id="{EC33B3A8-14F8-BC32-D165-8E5664CB5025}"/>
-              </a:ext>
-            </a:extLst>
-          </p:cNvPr>
-          <p:cNvPicPr>
-            <a:picLocks noGrp="1" noRot="1" noChangeAspect="1" noMove="1" noResize="1" noEditPoints="1" noAdjustHandles="1" noChangeArrowheads="1" noChangeShapeType="1" noCrop="1"/>
-          </p:cNvPicPr>
-          <p:nvPr/>
-        </p:nvPicPr>
-        <p:blipFill rotWithShape="1">
-          <a:blip r:embed="rId2">
-            <a:extLst>
-              <a:ext uri="{28A0092B-C50C-407E-A947-70E740481C1C}">
-                <a14:useLocalDpi xmlns:a14="http://schemas.microsoft.com/office/drawing/2010/main" val="0"/>
-              </a:ext>
-            </a:extLst>
-          </a:blip>
-          <a:srcRect/>
-          <a:stretch/>
-        </p:blipFill>
-        <p:spPr>
-          <a:xfrm>
-            <a:off x="-3047" y="10"/>
-            <a:ext cx="12191999" cy="6857990"/>
-          </a:xfrm>
-          <a:prstGeom prst="rect">
-            <a:avLst/>
-          </a:prstGeom>
           <a:solidFill>
             <a:srgbClr val="92D050"/>
           </a:solidFill>
@@ -6945,7 +6371,7 @@
                 <a:ea typeface="Open Sans ExtraBold" panose="020B0906030804020204" pitchFamily="34" charset="0"/>
                 <a:cs typeface="Open Sans ExtraBold" panose="020B0906030804020204" pitchFamily="34" charset="0"/>
               </a:rPr>
-              <a:t>PC 2</a:t>
+              <a:t>PC 3</a:t>
             </a:r>
             <a:endParaRPr lang="fr-BE" sz="2000" dirty="0">
               <a:ln w="19050">
@@ -11599,7 +11025,7 @@
 </p:sld>
 </file>
 
-<file path=ppt/slides/slide12.xml><?xml version="1.0" encoding="utf-8"?>
+<file path=ppt/slides/slide11.xml><?xml version="1.0" encoding="utf-8"?>
 <p:sld xmlns:a="http://schemas.openxmlformats.org/drawingml/2006/main" xmlns:r="http://schemas.openxmlformats.org/officeDocument/2006/relationships" xmlns:p="http://schemas.openxmlformats.org/presentationml/2006/main">
   <p:cSld>
     <p:spTree>
@@ -15148,13 +14574,13 @@
   <p:clrMapOvr>
     <a:masterClrMapping/>
   </p:clrMapOvr>
-  <mc:AlternateContent xmlns:mc="http://schemas.openxmlformats.org/markup-compatibility/2006">
-    <mc:Choice xmlns:p159="http://schemas.microsoft.com/office/powerpoint/2015/09/main" Requires="p159">
+  <mc:AlternateContent xmlns:mc="http://schemas.openxmlformats.org/markup-compatibility/2006" xmlns:p159="http://schemas.microsoft.com/office/powerpoint/2015/09/main">
+    <mc:Choice Requires="p159">
       <p:transition xmlns:p14="http://schemas.microsoft.com/office/powerpoint/2010/main" spd="slow" p14:dur="2000">
         <p159:morph option="byObject"/>
       </p:transition>
     </mc:Choice>
-    <mc:Fallback>
+    <mc:Fallback xmlns="">
       <p:transition spd="slow">
         <p:fade/>
       </p:transition>
@@ -17616,6 +17042,22 @@
                 <a:solidFill>
                   <a:srgbClr val="FFFFFF"/>
                 </a:solidFill>
+                <a:latin typeface="Open Sans ExtraBold" panose="020B0906030804020204" pitchFamily="34" charset="0"/>
+                <a:ea typeface="Open Sans ExtraBold" panose="020B0906030804020204" pitchFamily="34" charset="0"/>
+                <a:cs typeface="Open Sans ExtraBold" panose="020B0906030804020204" pitchFamily="34" charset="0"/>
+              </a:rPr>
+              <a:t>Identifie</a:t>
+            </a:r>
+            <a:r>
+              <a:rPr lang="fr-BE" sz="2800" dirty="0">
+                <a:ln w="28575">
+                  <a:solidFill>
+                    <a:schemeClr val="tx1"/>
+                  </a:solidFill>
+                </a:ln>
+                <a:solidFill>
+                  <a:srgbClr val="FFFFFF"/>
+                </a:solidFill>
                 <a:effectLst>
                   <a:outerShdw blurRad="38100" dist="38100" dir="2700000" algn="tl">
                     <a:srgbClr val="000000">
@@ -17627,7 +17069,7 @@
                 <a:ea typeface="Open Sans ExtraBold" panose="020B0906030804020204" pitchFamily="34" charset="0"/>
                 <a:cs typeface="Open Sans ExtraBold" panose="020B0906030804020204" pitchFamily="34" charset="0"/>
               </a:rPr>
-              <a:t>Identifie une carte réseau</a:t>
+              <a:t> une carte réseau</a:t>
             </a:r>
           </a:p>
           <a:p>
@@ -17645,6 +17087,22 @@
                 <a:solidFill>
                   <a:srgbClr val="FFFFFF"/>
                 </a:solidFill>
+                <a:latin typeface="Open Sans ExtraBold" panose="020B0906030804020204" pitchFamily="34" charset="0"/>
+                <a:ea typeface="Open Sans ExtraBold" panose="020B0906030804020204" pitchFamily="34" charset="0"/>
+                <a:cs typeface="Open Sans ExtraBold" panose="020B0906030804020204" pitchFamily="34" charset="0"/>
+              </a:rPr>
+              <a:t>Unique</a:t>
+            </a:r>
+            <a:r>
+              <a:rPr lang="fr-BE" sz="2800" dirty="0">
+                <a:ln w="28575">
+                  <a:solidFill>
+                    <a:schemeClr val="tx1"/>
+                  </a:solidFill>
+                </a:ln>
+                <a:solidFill>
+                  <a:srgbClr val="FFFFFF"/>
+                </a:solidFill>
                 <a:effectLst>
                   <a:outerShdw blurRad="38100" dist="38100" dir="2700000" algn="tl">
                     <a:srgbClr val="000000">
@@ -17656,7 +17114,7 @@
                 <a:ea typeface="Open Sans ExtraBold" panose="020B0906030804020204" pitchFamily="34" charset="0"/>
                 <a:cs typeface="Open Sans ExtraBold" panose="020B0906030804020204" pitchFamily="34" charset="0"/>
               </a:rPr>
-              <a:t>Unique au monde</a:t>
+              <a:t> au monde</a:t>
             </a:r>
           </a:p>
           <a:p>
@@ -18076,7 +17534,23 @@
                 <a:ea typeface="Open Sans ExtraBold" panose="020B0906030804020204" pitchFamily="34" charset="0"/>
                 <a:cs typeface="Open Sans ExtraBold" panose="020B0906030804020204" pitchFamily="34" charset="0"/>
               </a:rPr>
-              <a:t>6 octets</a:t>
+              <a:t>6 </a:t>
+            </a:r>
+            <a:r>
+              <a:rPr lang="fr-BE" sz="2800" dirty="0">
+                <a:ln w="28575">
+                  <a:solidFill>
+                    <a:schemeClr val="tx1"/>
+                  </a:solidFill>
+                </a:ln>
+                <a:solidFill>
+                  <a:srgbClr val="FFFFFF"/>
+                </a:solidFill>
+                <a:latin typeface="Open Sans ExtraBold" panose="020B0906030804020204" pitchFamily="34" charset="0"/>
+                <a:ea typeface="Open Sans ExtraBold" panose="020B0906030804020204" pitchFamily="34" charset="0"/>
+                <a:cs typeface="Open Sans ExtraBold" panose="020B0906030804020204" pitchFamily="34" charset="0"/>
+              </a:rPr>
+              <a:t>octets</a:t>
             </a:r>
           </a:p>
           <a:p>
@@ -18094,6 +17568,22 @@
                 <a:solidFill>
                   <a:srgbClr val="FFFFFF"/>
                 </a:solidFill>
+                <a:latin typeface="Open Sans ExtraBold" panose="020B0906030804020204" pitchFamily="34" charset="0"/>
+                <a:ea typeface="Open Sans ExtraBold" panose="020B0906030804020204" pitchFamily="34" charset="0"/>
+                <a:cs typeface="Open Sans ExtraBold" panose="020B0906030804020204" pitchFamily="34" charset="0"/>
+              </a:rPr>
+              <a:t>Format</a:t>
+            </a:r>
+            <a:r>
+              <a:rPr lang="fr-BE" sz="2800" dirty="0">
+                <a:ln w="28575">
+                  <a:solidFill>
+                    <a:schemeClr val="tx1"/>
+                  </a:solidFill>
+                </a:ln>
+                <a:solidFill>
+                  <a:srgbClr val="FFFFFF"/>
+                </a:solidFill>
                 <a:effectLst>
                   <a:outerShdw blurRad="38100" dist="38100" dir="2700000" algn="tl">
                     <a:srgbClr val="000000">
@@ -18105,7 +17595,7 @@
                 <a:ea typeface="Open Sans ExtraBold" panose="020B0906030804020204" pitchFamily="34" charset="0"/>
                 <a:cs typeface="Open Sans ExtraBold" panose="020B0906030804020204" pitchFamily="34" charset="0"/>
               </a:rPr>
-              <a:t>Format à double points</a:t>
+              <a:t> à double points</a:t>
             </a:r>
           </a:p>
           <a:p>
@@ -18123,6 +17613,22 @@
                 <a:solidFill>
                   <a:srgbClr val="FFFFFF"/>
                 </a:solidFill>
+                <a:latin typeface="Open Sans ExtraBold" panose="020B0906030804020204" pitchFamily="34" charset="0"/>
+                <a:ea typeface="Open Sans ExtraBold" panose="020B0906030804020204" pitchFamily="34" charset="0"/>
+                <a:cs typeface="Open Sans ExtraBold" panose="020B0906030804020204" pitchFamily="34" charset="0"/>
+              </a:rPr>
+              <a:t>Notation</a:t>
+            </a:r>
+            <a:r>
+              <a:rPr lang="fr-BE" sz="2800" dirty="0">
+                <a:ln w="28575">
+                  <a:solidFill>
+                    <a:schemeClr val="tx1"/>
+                  </a:solidFill>
+                </a:ln>
+                <a:solidFill>
+                  <a:srgbClr val="FFFFFF"/>
+                </a:solidFill>
                 <a:effectLst>
                   <a:outerShdw blurRad="38100" dist="38100" dir="2700000" algn="tl">
                     <a:srgbClr val="000000">
@@ -18134,7 +17640,7 @@
                 <a:ea typeface="Open Sans ExtraBold" panose="020B0906030804020204" pitchFamily="34" charset="0"/>
                 <a:cs typeface="Open Sans ExtraBold" panose="020B0906030804020204" pitchFamily="34" charset="0"/>
               </a:rPr>
-              <a:t>Notation hexadécimale</a:t>
+              <a:t> hexadécimale</a:t>
             </a:r>
           </a:p>
           <a:p>
@@ -22368,1005 +21874,6 @@
                 <a:ea typeface="Open Sans ExtraBold" panose="020B0906030804020204" pitchFamily="34" charset="0"/>
                 <a:cs typeface="Open Sans ExtraBold" panose="020B0906030804020204" pitchFamily="34" charset="0"/>
               </a:rPr>
-              <a:t>Couches OSI</a:t>
-            </a:r>
-            <a:endParaRPr lang="fr-BE" sz="5400" dirty="0">
-              <a:ln w="38100">
-                <a:solidFill>
-                  <a:schemeClr val="tx1"/>
-                </a:solidFill>
-              </a:ln>
-              <a:solidFill>
-                <a:srgbClr val="FF0000"/>
-              </a:solidFill>
-              <a:latin typeface="Open Sans ExtraBold" panose="020B0906030804020204" pitchFamily="34" charset="0"/>
-              <a:ea typeface="Open Sans ExtraBold" panose="020B0906030804020204" pitchFamily="34" charset="0"/>
-              <a:cs typeface="Open Sans ExtraBold" panose="020B0906030804020204" pitchFamily="34" charset="0"/>
-            </a:endParaRPr>
-          </a:p>
-        </p:txBody>
-      </p:sp>
-      <p:sp>
-        <p:nvSpPr>
-          <p:cNvPr id="9" name="Rectangle : coins arrondis 8">
-            <a:extLst>
-              <a:ext uri="{FF2B5EF4-FFF2-40B4-BE49-F238E27FC236}">
-                <a16:creationId xmlns:a16="http://schemas.microsoft.com/office/drawing/2014/main" id="{B78F06C7-F434-258A-0500-AC4769C44562}"/>
-              </a:ext>
-            </a:extLst>
-          </p:cNvPr>
-          <p:cNvSpPr/>
-          <p:nvPr/>
-        </p:nvSpPr>
-        <p:spPr>
-          <a:xfrm>
-            <a:off x="4685778" y="5117432"/>
-            <a:ext cx="2820444" cy="810126"/>
-          </a:xfrm>
-          <a:prstGeom prst="roundRect">
-            <a:avLst/>
-          </a:prstGeom>
-          <a:solidFill>
-            <a:schemeClr val="accent6"/>
-          </a:solidFill>
-          <a:ln w="28575">
-            <a:solidFill>
-              <a:schemeClr val="tx1"/>
-            </a:solidFill>
-          </a:ln>
-        </p:spPr>
-        <p:style>
-          <a:lnRef idx="2">
-            <a:schemeClr val="accent1">
-              <a:shade val="50000"/>
-            </a:schemeClr>
-          </a:lnRef>
-          <a:fillRef idx="1">
-            <a:schemeClr val="accent1"/>
-          </a:fillRef>
-          <a:effectRef idx="0">
-            <a:schemeClr val="accent1"/>
-          </a:effectRef>
-          <a:fontRef idx="minor">
-            <a:schemeClr val="lt1"/>
-          </a:fontRef>
-        </p:style>
-        <p:txBody>
-          <a:bodyPr rtlCol="0" anchor="ctr"/>
-          <a:lstStyle/>
-          <a:p>
-            <a:pPr algn="ctr"/>
-            <a:r>
-              <a:rPr lang="fr-FR" sz="3200" dirty="0">
-                <a:ln w="28575">
-                  <a:solidFill>
-                    <a:sysClr val="windowText" lastClr="000000"/>
-                  </a:solidFill>
-                </a:ln>
-                <a:solidFill>
-                  <a:srgbClr val="FF0000"/>
-                </a:solidFill>
-                <a:latin typeface="Open Sans ExtraBold" panose="020B0906030804020204" pitchFamily="34" charset="0"/>
-                <a:ea typeface="Open Sans ExtraBold" panose="020B0906030804020204" pitchFamily="34" charset="0"/>
-                <a:cs typeface="Open Sans ExtraBold" panose="020B0906030804020204" pitchFamily="34" charset="0"/>
-              </a:rPr>
-              <a:t>Physique</a:t>
-            </a:r>
-            <a:endParaRPr lang="fr-BE" sz="3200" dirty="0">
-              <a:ln w="28575">
-                <a:solidFill>
-                  <a:sysClr val="windowText" lastClr="000000"/>
-                </a:solidFill>
-              </a:ln>
-              <a:solidFill>
-                <a:srgbClr val="FF0000"/>
-              </a:solidFill>
-              <a:latin typeface="Open Sans ExtraBold" panose="020B0906030804020204" pitchFamily="34" charset="0"/>
-              <a:ea typeface="Open Sans ExtraBold" panose="020B0906030804020204" pitchFamily="34" charset="0"/>
-              <a:cs typeface="Open Sans ExtraBold" panose="020B0906030804020204" pitchFamily="34" charset="0"/>
-            </a:endParaRPr>
-          </a:p>
-        </p:txBody>
-      </p:sp>
-      <p:sp>
-        <p:nvSpPr>
-          <p:cNvPr id="3" name="Rectangle : coins arrondis 2">
-            <a:extLst>
-              <a:ext uri="{FF2B5EF4-FFF2-40B4-BE49-F238E27FC236}">
-                <a16:creationId xmlns:a16="http://schemas.microsoft.com/office/drawing/2014/main" id="{D52A85B2-C5E6-3781-D867-B4F6847BDDD7}"/>
-              </a:ext>
-            </a:extLst>
-          </p:cNvPr>
-          <p:cNvSpPr/>
-          <p:nvPr/>
-        </p:nvSpPr>
-        <p:spPr>
-          <a:xfrm>
-            <a:off x="4682730" y="4251159"/>
-            <a:ext cx="2820444" cy="810126"/>
-          </a:xfrm>
-          <a:prstGeom prst="roundRect">
-            <a:avLst/>
-          </a:prstGeom>
-          <a:solidFill>
-            <a:schemeClr val="accent6"/>
-          </a:solidFill>
-          <a:ln w="28575">
-            <a:solidFill>
-              <a:schemeClr val="tx1"/>
-            </a:solidFill>
-          </a:ln>
-        </p:spPr>
-        <p:style>
-          <a:lnRef idx="2">
-            <a:schemeClr val="accent1">
-              <a:shade val="50000"/>
-            </a:schemeClr>
-          </a:lnRef>
-          <a:fillRef idx="1">
-            <a:schemeClr val="accent1"/>
-          </a:fillRef>
-          <a:effectRef idx="0">
-            <a:schemeClr val="accent1"/>
-          </a:effectRef>
-          <a:fontRef idx="minor">
-            <a:schemeClr val="lt1"/>
-          </a:fontRef>
-        </p:style>
-        <p:txBody>
-          <a:bodyPr rtlCol="0" anchor="ctr"/>
-          <a:lstStyle/>
-          <a:p>
-            <a:pPr algn="ctr"/>
-            <a:r>
-              <a:rPr lang="fr-FR" sz="3200" dirty="0">
-                <a:ln w="28575">
-                  <a:solidFill>
-                    <a:sysClr val="windowText" lastClr="000000"/>
-                  </a:solidFill>
-                </a:ln>
-                <a:solidFill>
-                  <a:srgbClr val="FF0000"/>
-                </a:solidFill>
-                <a:latin typeface="Open Sans ExtraBold" panose="020B0906030804020204" pitchFamily="34" charset="0"/>
-                <a:ea typeface="Open Sans ExtraBold" panose="020B0906030804020204" pitchFamily="34" charset="0"/>
-                <a:cs typeface="Open Sans ExtraBold" panose="020B0906030804020204" pitchFamily="34" charset="0"/>
-              </a:rPr>
-              <a:t>Liaison</a:t>
-            </a:r>
-            <a:endParaRPr lang="fr-BE" sz="3200" dirty="0">
-              <a:ln w="28575">
-                <a:solidFill>
-                  <a:sysClr val="windowText" lastClr="000000"/>
-                </a:solidFill>
-              </a:ln>
-              <a:solidFill>
-                <a:srgbClr val="FF0000"/>
-              </a:solidFill>
-              <a:latin typeface="Open Sans ExtraBold" panose="020B0906030804020204" pitchFamily="34" charset="0"/>
-              <a:ea typeface="Open Sans ExtraBold" panose="020B0906030804020204" pitchFamily="34" charset="0"/>
-              <a:cs typeface="Open Sans ExtraBold" panose="020B0906030804020204" pitchFamily="34" charset="0"/>
-            </a:endParaRPr>
-          </a:p>
-        </p:txBody>
-      </p:sp>
-      <p:sp>
-        <p:nvSpPr>
-          <p:cNvPr id="4" name="Rectangle : coins arrondis 3">
-            <a:extLst>
-              <a:ext uri="{FF2B5EF4-FFF2-40B4-BE49-F238E27FC236}">
-                <a16:creationId xmlns:a16="http://schemas.microsoft.com/office/drawing/2014/main" id="{DF3D68CE-D664-9C0B-D74C-6C92CFDBE5D0}"/>
-              </a:ext>
-            </a:extLst>
-          </p:cNvPr>
-          <p:cNvSpPr/>
-          <p:nvPr/>
-        </p:nvSpPr>
-        <p:spPr>
-          <a:xfrm>
-            <a:off x="4682730" y="3376864"/>
-            <a:ext cx="2820444" cy="810126"/>
-          </a:xfrm>
-          <a:prstGeom prst="roundRect">
-            <a:avLst/>
-          </a:prstGeom>
-          <a:solidFill>
-            <a:schemeClr val="accent6"/>
-          </a:solidFill>
-          <a:ln w="28575">
-            <a:solidFill>
-              <a:schemeClr val="tx1"/>
-            </a:solidFill>
-          </a:ln>
-        </p:spPr>
-        <p:style>
-          <a:lnRef idx="2">
-            <a:schemeClr val="accent1">
-              <a:shade val="50000"/>
-            </a:schemeClr>
-          </a:lnRef>
-          <a:fillRef idx="1">
-            <a:schemeClr val="accent1"/>
-          </a:fillRef>
-          <a:effectRef idx="0">
-            <a:schemeClr val="accent1"/>
-          </a:effectRef>
-          <a:fontRef idx="minor">
-            <a:schemeClr val="lt1"/>
-          </a:fontRef>
-        </p:style>
-        <p:txBody>
-          <a:bodyPr rtlCol="0" anchor="ctr"/>
-          <a:lstStyle/>
-          <a:p>
-            <a:pPr algn="ctr"/>
-            <a:r>
-              <a:rPr lang="fr-FR" sz="3200" dirty="0">
-                <a:ln w="28575">
-                  <a:solidFill>
-                    <a:sysClr val="windowText" lastClr="000000"/>
-                  </a:solidFill>
-                </a:ln>
-                <a:solidFill>
-                  <a:srgbClr val="FF0000"/>
-                </a:solidFill>
-                <a:latin typeface="Open Sans ExtraBold" panose="020B0906030804020204" pitchFamily="34" charset="0"/>
-                <a:ea typeface="Open Sans ExtraBold" panose="020B0906030804020204" pitchFamily="34" charset="0"/>
-                <a:cs typeface="Open Sans ExtraBold" panose="020B0906030804020204" pitchFamily="34" charset="0"/>
-              </a:rPr>
-              <a:t>Réseau</a:t>
-            </a:r>
-            <a:endParaRPr lang="fr-BE" sz="3200" dirty="0">
-              <a:ln w="28575">
-                <a:solidFill>
-                  <a:sysClr val="windowText" lastClr="000000"/>
-                </a:solidFill>
-              </a:ln>
-              <a:solidFill>
-                <a:srgbClr val="FF0000"/>
-              </a:solidFill>
-              <a:latin typeface="Open Sans ExtraBold" panose="020B0906030804020204" pitchFamily="34" charset="0"/>
-              <a:ea typeface="Open Sans ExtraBold" panose="020B0906030804020204" pitchFamily="34" charset="0"/>
-              <a:cs typeface="Open Sans ExtraBold" panose="020B0906030804020204" pitchFamily="34" charset="0"/>
-            </a:endParaRPr>
-          </a:p>
-        </p:txBody>
-      </p:sp>
-      <p:sp>
-        <p:nvSpPr>
-          <p:cNvPr id="16" name="Titre 1">
-            <a:extLst>
-              <a:ext uri="{FF2B5EF4-FFF2-40B4-BE49-F238E27FC236}">
-                <a16:creationId xmlns:a16="http://schemas.microsoft.com/office/drawing/2014/main" id="{9E12199F-C988-2047-DF0C-090DEF18C1AD}"/>
-              </a:ext>
-            </a:extLst>
-          </p:cNvPr>
-          <p:cNvSpPr txBox="1">
-            <a:spLocks/>
-          </p:cNvSpPr>
-          <p:nvPr/>
-        </p:nvSpPr>
-        <p:spPr>
-          <a:xfrm>
-            <a:off x="7179702" y="4325568"/>
-            <a:ext cx="3253110" cy="661307"/>
-          </a:xfrm>
-          <a:prstGeom prst="rect">
-            <a:avLst/>
-          </a:prstGeom>
-        </p:spPr>
-        <p:txBody>
-          <a:bodyPr vert="horz" lIns="91440" tIns="45720" rIns="91440" bIns="45720" rtlCol="0" anchor="b">
-            <a:normAutofit fontScale="85000" lnSpcReduction="20000"/>
-          </a:bodyPr>
-          <a:lstStyle>
-            <a:lvl1pPr algn="ctr" defTabSz="914400" rtl="0" eaLnBrk="1" latinLnBrk="0" hangingPunct="1">
-              <a:lnSpc>
-                <a:spcPct val="90000"/>
-              </a:lnSpc>
-              <a:spcBef>
-                <a:spcPct val="0"/>
-              </a:spcBef>
-              <a:buNone/>
-              <a:defRPr sz="6000" kern="1200">
-                <a:solidFill>
-                  <a:schemeClr val="tx1"/>
-                </a:solidFill>
-                <a:latin typeface="+mj-lt"/>
-                <a:ea typeface="+mj-ea"/>
-                <a:cs typeface="+mj-cs"/>
-              </a:defRPr>
-            </a:lvl1pPr>
-          </a:lstStyle>
-          <a:p>
-            <a:r>
-              <a:rPr lang="fr-FR" sz="2800" dirty="0">
-                <a:ln w="28575">
-                  <a:solidFill>
-                    <a:schemeClr val="tx1"/>
-                  </a:solidFill>
-                </a:ln>
-                <a:solidFill>
-                  <a:srgbClr val="00B0F0"/>
-                </a:solidFill>
-                <a:latin typeface="Open Sans ExtraBold" panose="020B0906030804020204" pitchFamily="34" charset="0"/>
-                <a:ea typeface="Open Sans ExtraBold" panose="020B0906030804020204" pitchFamily="34" charset="0"/>
-                <a:cs typeface="Open Sans ExtraBold" panose="020B0906030804020204" pitchFamily="34" charset="0"/>
-              </a:rPr>
-              <a:t>Adresses MAC</a:t>
-            </a:r>
-          </a:p>
-          <a:p>
-            <a:r>
-              <a:rPr lang="fr-FR" sz="2800" dirty="0" err="1">
-                <a:ln w="28575">
-                  <a:solidFill>
-                    <a:schemeClr val="tx1"/>
-                  </a:solidFill>
-                </a:ln>
-                <a:solidFill>
-                  <a:srgbClr val="00B0F0"/>
-                </a:solidFill>
-                <a:latin typeface="Open Sans ExtraBold" panose="020B0906030804020204" pitchFamily="34" charset="0"/>
-                <a:ea typeface="Open Sans ExtraBold" panose="020B0906030804020204" pitchFamily="34" charset="0"/>
-                <a:cs typeface="Open Sans ExtraBold" panose="020B0906030804020204" pitchFamily="34" charset="0"/>
-              </a:rPr>
-              <a:t>Switchs</a:t>
-            </a:r>
-            <a:endParaRPr lang="fr-BE" sz="2800" dirty="0">
-              <a:ln w="28575">
-                <a:solidFill>
-                  <a:schemeClr val="tx1"/>
-                </a:solidFill>
-              </a:ln>
-              <a:solidFill>
-                <a:srgbClr val="00B0F0"/>
-              </a:solidFill>
-              <a:latin typeface="Open Sans ExtraBold" panose="020B0906030804020204" pitchFamily="34" charset="0"/>
-              <a:ea typeface="Open Sans ExtraBold" panose="020B0906030804020204" pitchFamily="34" charset="0"/>
-              <a:cs typeface="Open Sans ExtraBold" panose="020B0906030804020204" pitchFamily="34" charset="0"/>
-            </a:endParaRPr>
-          </a:p>
-        </p:txBody>
-      </p:sp>
-      <p:sp>
-        <p:nvSpPr>
-          <p:cNvPr id="17" name="Titre 1">
-            <a:extLst>
-              <a:ext uri="{FF2B5EF4-FFF2-40B4-BE49-F238E27FC236}">
-                <a16:creationId xmlns:a16="http://schemas.microsoft.com/office/drawing/2014/main" id="{E624BF18-A545-00E3-EBA3-404A03D526DE}"/>
-              </a:ext>
-            </a:extLst>
-          </p:cNvPr>
-          <p:cNvSpPr txBox="1">
-            <a:spLocks/>
-          </p:cNvSpPr>
-          <p:nvPr/>
-        </p:nvSpPr>
-        <p:spPr>
-          <a:xfrm>
-            <a:off x="7179702" y="3515442"/>
-            <a:ext cx="3253110" cy="661307"/>
-          </a:xfrm>
-          <a:prstGeom prst="rect">
-            <a:avLst/>
-          </a:prstGeom>
-        </p:spPr>
-        <p:txBody>
-          <a:bodyPr vert="horz" lIns="91440" tIns="45720" rIns="91440" bIns="45720" rtlCol="0" anchor="b">
-            <a:normAutofit fontScale="85000" lnSpcReduction="20000"/>
-          </a:bodyPr>
-          <a:lstStyle>
-            <a:lvl1pPr algn="ctr" defTabSz="914400" rtl="0" eaLnBrk="1" latinLnBrk="0" hangingPunct="1">
-              <a:lnSpc>
-                <a:spcPct val="90000"/>
-              </a:lnSpc>
-              <a:spcBef>
-                <a:spcPct val="0"/>
-              </a:spcBef>
-              <a:buNone/>
-              <a:defRPr sz="6000" kern="1200">
-                <a:solidFill>
-                  <a:schemeClr val="tx1"/>
-                </a:solidFill>
-                <a:latin typeface="+mj-lt"/>
-                <a:ea typeface="+mj-ea"/>
-                <a:cs typeface="+mj-cs"/>
-              </a:defRPr>
-            </a:lvl1pPr>
-          </a:lstStyle>
-          <a:p>
-            <a:r>
-              <a:rPr lang="fr-FR" sz="2800" dirty="0">
-                <a:ln w="28575">
-                  <a:solidFill>
-                    <a:schemeClr val="tx1"/>
-                  </a:solidFill>
-                </a:ln>
-                <a:solidFill>
-                  <a:srgbClr val="00B0F0"/>
-                </a:solidFill>
-                <a:latin typeface="Open Sans ExtraBold" panose="020B0906030804020204" pitchFamily="34" charset="0"/>
-                <a:ea typeface="Open Sans ExtraBold" panose="020B0906030804020204" pitchFamily="34" charset="0"/>
-                <a:cs typeface="Open Sans ExtraBold" panose="020B0906030804020204" pitchFamily="34" charset="0"/>
-              </a:rPr>
-              <a:t>Adresses IP</a:t>
-            </a:r>
-          </a:p>
-          <a:p>
-            <a:r>
-              <a:rPr lang="fr-BE" sz="2800" dirty="0">
-                <a:ln w="28575">
-                  <a:solidFill>
-                    <a:schemeClr val="tx1"/>
-                  </a:solidFill>
-                </a:ln>
-                <a:solidFill>
-                  <a:srgbClr val="00B0F0"/>
-                </a:solidFill>
-                <a:latin typeface="Open Sans ExtraBold" panose="020B0906030804020204" pitchFamily="34" charset="0"/>
-                <a:ea typeface="Open Sans ExtraBold" panose="020B0906030804020204" pitchFamily="34" charset="0"/>
-                <a:cs typeface="Open Sans ExtraBold" panose="020B0906030804020204" pitchFamily="34" charset="0"/>
-              </a:rPr>
-              <a:t>Routeurs</a:t>
-            </a:r>
-          </a:p>
-        </p:txBody>
-      </p:sp>
-    </p:spTree>
-    <p:extLst>
-      <p:ext uri="{BB962C8B-B14F-4D97-AF65-F5344CB8AC3E}">
-        <p14:creationId xmlns:p14="http://schemas.microsoft.com/office/powerpoint/2010/main" val="3998782517"/>
-      </p:ext>
-    </p:extLst>
-  </p:cSld>
-  <p:clrMapOvr>
-    <a:masterClrMapping/>
-  </p:clrMapOvr>
-  <mc:AlternateContent xmlns:mc="http://schemas.openxmlformats.org/markup-compatibility/2006" xmlns:p159="http://schemas.microsoft.com/office/powerpoint/2015/09/main">
-    <mc:Choice Requires="p159">
-      <p:transition xmlns:p14="http://schemas.microsoft.com/office/powerpoint/2010/main" spd="slow" p14:dur="2000">
-        <p159:morph option="byObject"/>
-      </p:transition>
-    </mc:Choice>
-    <mc:Fallback xmlns="">
-      <p:transition spd="slow">
-        <p:fade/>
-      </p:transition>
-    </mc:Fallback>
-  </mc:AlternateContent>
-  <p:timing>
-    <p:tnLst>
-      <p:par>
-        <p:cTn id="1" dur="indefinite" restart="never" nodeType="tmRoot">
-          <p:childTnLst>
-            <p:seq concurrent="1" nextAc="seek">
-              <p:cTn id="2" dur="indefinite" nodeType="mainSeq">
-                <p:childTnLst>
-                  <p:par>
-                    <p:cTn id="3" fill="hold">
-                      <p:stCondLst>
-                        <p:cond delay="indefinite"/>
-                      </p:stCondLst>
-                      <p:childTnLst>
-                        <p:par>
-                          <p:cTn id="4" fill="hold">
-                            <p:stCondLst>
-                              <p:cond delay="0"/>
-                            </p:stCondLst>
-                            <p:childTnLst>
-                              <p:par>
-                                <p:cTn id="5" presetID="2" presetClass="entr" presetSubtype="1" fill="hold" grpId="0" nodeType="clickEffect">
-                                  <p:stCondLst>
-                                    <p:cond delay="0"/>
-                                  </p:stCondLst>
-                                  <p:childTnLst>
-                                    <p:set>
-                                      <p:cBhvr>
-                                        <p:cTn id="6" dur="1" fill="hold">
-                                          <p:stCondLst>
-                                            <p:cond delay="0"/>
-                                          </p:stCondLst>
-                                        </p:cTn>
-                                        <p:tgtEl>
-                                          <p:spTgt spid="9"/>
-                                        </p:tgtEl>
-                                        <p:attrNameLst>
-                                          <p:attrName>style.visibility</p:attrName>
-                                        </p:attrNameLst>
-                                      </p:cBhvr>
-                                      <p:to>
-                                        <p:strVal val="visible"/>
-                                      </p:to>
-                                    </p:set>
-                                    <p:anim calcmode="lin" valueType="num">
-                                      <p:cBhvr additive="base">
-                                        <p:cTn id="7" dur="500" fill="hold"/>
-                                        <p:tgtEl>
-                                          <p:spTgt spid="9"/>
-                                        </p:tgtEl>
-                                        <p:attrNameLst>
-                                          <p:attrName>ppt_x</p:attrName>
-                                        </p:attrNameLst>
-                                      </p:cBhvr>
-                                      <p:tavLst>
-                                        <p:tav tm="0">
-                                          <p:val>
-                                            <p:strVal val="#ppt_x"/>
-                                          </p:val>
-                                        </p:tav>
-                                        <p:tav tm="100000">
-                                          <p:val>
-                                            <p:strVal val="#ppt_x"/>
-                                          </p:val>
-                                        </p:tav>
-                                      </p:tavLst>
-                                    </p:anim>
-                                    <p:anim calcmode="lin" valueType="num">
-                                      <p:cBhvr additive="base">
-                                        <p:cTn id="8" dur="500" fill="hold"/>
-                                        <p:tgtEl>
-                                          <p:spTgt spid="9"/>
-                                        </p:tgtEl>
-                                        <p:attrNameLst>
-                                          <p:attrName>ppt_y</p:attrName>
-                                        </p:attrNameLst>
-                                      </p:cBhvr>
-                                      <p:tavLst>
-                                        <p:tav tm="0">
-                                          <p:val>
-                                            <p:strVal val="0-#ppt_h/2"/>
-                                          </p:val>
-                                        </p:tav>
-                                        <p:tav tm="100000">
-                                          <p:val>
-                                            <p:strVal val="#ppt_y"/>
-                                          </p:val>
-                                        </p:tav>
-                                      </p:tavLst>
-                                    </p:anim>
-                                  </p:childTnLst>
-                                </p:cTn>
-                              </p:par>
-                            </p:childTnLst>
-                          </p:cTn>
-                        </p:par>
-                      </p:childTnLst>
-                    </p:cTn>
-                  </p:par>
-                  <p:par>
-                    <p:cTn id="9" fill="hold">
-                      <p:stCondLst>
-                        <p:cond delay="indefinite"/>
-                      </p:stCondLst>
-                      <p:childTnLst>
-                        <p:par>
-                          <p:cTn id="10" fill="hold">
-                            <p:stCondLst>
-                              <p:cond delay="0"/>
-                            </p:stCondLst>
-                            <p:childTnLst>
-                              <p:par>
-                                <p:cTn id="11" presetID="2" presetClass="entr" presetSubtype="1" fill="hold" grpId="0" nodeType="clickEffect">
-                                  <p:stCondLst>
-                                    <p:cond delay="0"/>
-                                  </p:stCondLst>
-                                  <p:childTnLst>
-                                    <p:set>
-                                      <p:cBhvr>
-                                        <p:cTn id="12" dur="1" fill="hold">
-                                          <p:stCondLst>
-                                            <p:cond delay="0"/>
-                                          </p:stCondLst>
-                                        </p:cTn>
-                                        <p:tgtEl>
-                                          <p:spTgt spid="3"/>
-                                        </p:tgtEl>
-                                        <p:attrNameLst>
-                                          <p:attrName>style.visibility</p:attrName>
-                                        </p:attrNameLst>
-                                      </p:cBhvr>
-                                      <p:to>
-                                        <p:strVal val="visible"/>
-                                      </p:to>
-                                    </p:set>
-                                    <p:anim calcmode="lin" valueType="num">
-                                      <p:cBhvr additive="base">
-                                        <p:cTn id="13" dur="500" fill="hold"/>
-                                        <p:tgtEl>
-                                          <p:spTgt spid="3"/>
-                                        </p:tgtEl>
-                                        <p:attrNameLst>
-                                          <p:attrName>ppt_x</p:attrName>
-                                        </p:attrNameLst>
-                                      </p:cBhvr>
-                                      <p:tavLst>
-                                        <p:tav tm="0">
-                                          <p:val>
-                                            <p:strVal val="#ppt_x"/>
-                                          </p:val>
-                                        </p:tav>
-                                        <p:tav tm="100000">
-                                          <p:val>
-                                            <p:strVal val="#ppt_x"/>
-                                          </p:val>
-                                        </p:tav>
-                                      </p:tavLst>
-                                    </p:anim>
-                                    <p:anim calcmode="lin" valueType="num">
-                                      <p:cBhvr additive="base">
-                                        <p:cTn id="14" dur="500" fill="hold"/>
-                                        <p:tgtEl>
-                                          <p:spTgt spid="3"/>
-                                        </p:tgtEl>
-                                        <p:attrNameLst>
-                                          <p:attrName>ppt_y</p:attrName>
-                                        </p:attrNameLst>
-                                      </p:cBhvr>
-                                      <p:tavLst>
-                                        <p:tav tm="0">
-                                          <p:val>
-                                            <p:strVal val="0-#ppt_h/2"/>
-                                          </p:val>
-                                        </p:tav>
-                                        <p:tav tm="100000">
-                                          <p:val>
-                                            <p:strVal val="#ppt_y"/>
-                                          </p:val>
-                                        </p:tav>
-                                      </p:tavLst>
-                                    </p:anim>
-                                  </p:childTnLst>
-                                </p:cTn>
-                              </p:par>
-                            </p:childTnLst>
-                          </p:cTn>
-                        </p:par>
-                      </p:childTnLst>
-                    </p:cTn>
-                  </p:par>
-                  <p:par>
-                    <p:cTn id="15" fill="hold">
-                      <p:stCondLst>
-                        <p:cond delay="indefinite"/>
-                      </p:stCondLst>
-                      <p:childTnLst>
-                        <p:par>
-                          <p:cTn id="16" fill="hold">
-                            <p:stCondLst>
-                              <p:cond delay="0"/>
-                            </p:stCondLst>
-                            <p:childTnLst>
-                              <p:par>
-                                <p:cTn id="17" presetID="2" presetClass="entr" presetSubtype="1" fill="hold" grpId="0" nodeType="clickEffect">
-                                  <p:stCondLst>
-                                    <p:cond delay="0"/>
-                                  </p:stCondLst>
-                                  <p:childTnLst>
-                                    <p:set>
-                                      <p:cBhvr>
-                                        <p:cTn id="18" dur="1" fill="hold">
-                                          <p:stCondLst>
-                                            <p:cond delay="0"/>
-                                          </p:stCondLst>
-                                        </p:cTn>
-                                        <p:tgtEl>
-                                          <p:spTgt spid="4"/>
-                                        </p:tgtEl>
-                                        <p:attrNameLst>
-                                          <p:attrName>style.visibility</p:attrName>
-                                        </p:attrNameLst>
-                                      </p:cBhvr>
-                                      <p:to>
-                                        <p:strVal val="visible"/>
-                                      </p:to>
-                                    </p:set>
-                                    <p:anim calcmode="lin" valueType="num">
-                                      <p:cBhvr additive="base">
-                                        <p:cTn id="19" dur="500" fill="hold"/>
-                                        <p:tgtEl>
-                                          <p:spTgt spid="4"/>
-                                        </p:tgtEl>
-                                        <p:attrNameLst>
-                                          <p:attrName>ppt_x</p:attrName>
-                                        </p:attrNameLst>
-                                      </p:cBhvr>
-                                      <p:tavLst>
-                                        <p:tav tm="0">
-                                          <p:val>
-                                            <p:strVal val="#ppt_x"/>
-                                          </p:val>
-                                        </p:tav>
-                                        <p:tav tm="100000">
-                                          <p:val>
-                                            <p:strVal val="#ppt_x"/>
-                                          </p:val>
-                                        </p:tav>
-                                      </p:tavLst>
-                                    </p:anim>
-                                    <p:anim calcmode="lin" valueType="num">
-                                      <p:cBhvr additive="base">
-                                        <p:cTn id="20" dur="500" fill="hold"/>
-                                        <p:tgtEl>
-                                          <p:spTgt spid="4"/>
-                                        </p:tgtEl>
-                                        <p:attrNameLst>
-                                          <p:attrName>ppt_y</p:attrName>
-                                        </p:attrNameLst>
-                                      </p:cBhvr>
-                                      <p:tavLst>
-                                        <p:tav tm="0">
-                                          <p:val>
-                                            <p:strVal val="0-#ppt_h/2"/>
-                                          </p:val>
-                                        </p:tav>
-                                        <p:tav tm="100000">
-                                          <p:val>
-                                            <p:strVal val="#ppt_y"/>
-                                          </p:val>
-                                        </p:tav>
-                                      </p:tavLst>
-                                    </p:anim>
-                                  </p:childTnLst>
-                                </p:cTn>
-                              </p:par>
-                            </p:childTnLst>
-                          </p:cTn>
-                        </p:par>
-                      </p:childTnLst>
-                    </p:cTn>
-                  </p:par>
-                  <p:par>
-                    <p:cTn id="21" fill="hold">
-                      <p:stCondLst>
-                        <p:cond delay="indefinite"/>
-                      </p:stCondLst>
-                      <p:childTnLst>
-                        <p:par>
-                          <p:cTn id="22" fill="hold">
-                            <p:stCondLst>
-                              <p:cond delay="0"/>
-                            </p:stCondLst>
-                            <p:childTnLst>
-                              <p:par>
-                                <p:cTn id="23" presetID="10" presetClass="entr" presetSubtype="0" fill="hold" grpId="0" nodeType="clickEffect">
-                                  <p:stCondLst>
-                                    <p:cond delay="0"/>
-                                  </p:stCondLst>
-                                  <p:childTnLst>
-                                    <p:set>
-                                      <p:cBhvr>
-                                        <p:cTn id="24" dur="1" fill="hold">
-                                          <p:stCondLst>
-                                            <p:cond delay="0"/>
-                                          </p:stCondLst>
-                                        </p:cTn>
-                                        <p:tgtEl>
-                                          <p:spTgt spid="16"/>
-                                        </p:tgtEl>
-                                        <p:attrNameLst>
-                                          <p:attrName>style.visibility</p:attrName>
-                                        </p:attrNameLst>
-                                      </p:cBhvr>
-                                      <p:to>
-                                        <p:strVal val="visible"/>
-                                      </p:to>
-                                    </p:set>
-                                    <p:animEffect transition="in" filter="fade">
-                                      <p:cBhvr>
-                                        <p:cTn id="25" dur="500"/>
-                                        <p:tgtEl>
-                                          <p:spTgt spid="16"/>
-                                        </p:tgtEl>
-                                      </p:cBhvr>
-                                    </p:animEffect>
-                                  </p:childTnLst>
-                                </p:cTn>
-                              </p:par>
-                            </p:childTnLst>
-                          </p:cTn>
-                        </p:par>
-                      </p:childTnLst>
-                    </p:cTn>
-                  </p:par>
-                  <p:par>
-                    <p:cTn id="26" fill="hold">
-                      <p:stCondLst>
-                        <p:cond delay="indefinite"/>
-                      </p:stCondLst>
-                      <p:childTnLst>
-                        <p:par>
-                          <p:cTn id="27" fill="hold">
-                            <p:stCondLst>
-                              <p:cond delay="0"/>
-                            </p:stCondLst>
-                            <p:childTnLst>
-                              <p:par>
-                                <p:cTn id="28" presetID="10" presetClass="entr" presetSubtype="0" fill="hold" grpId="0" nodeType="clickEffect">
-                                  <p:stCondLst>
-                                    <p:cond delay="0"/>
-                                  </p:stCondLst>
-                                  <p:childTnLst>
-                                    <p:set>
-                                      <p:cBhvr>
-                                        <p:cTn id="29" dur="1" fill="hold">
-                                          <p:stCondLst>
-                                            <p:cond delay="0"/>
-                                          </p:stCondLst>
-                                        </p:cTn>
-                                        <p:tgtEl>
-                                          <p:spTgt spid="17"/>
-                                        </p:tgtEl>
-                                        <p:attrNameLst>
-                                          <p:attrName>style.visibility</p:attrName>
-                                        </p:attrNameLst>
-                                      </p:cBhvr>
-                                      <p:to>
-                                        <p:strVal val="visible"/>
-                                      </p:to>
-                                    </p:set>
-                                    <p:animEffect transition="in" filter="fade">
-                                      <p:cBhvr>
-                                        <p:cTn id="30" dur="500"/>
-                                        <p:tgtEl>
-                                          <p:spTgt spid="17"/>
-                                        </p:tgtEl>
-                                      </p:cBhvr>
-                                    </p:animEffect>
-                                  </p:childTnLst>
-                                </p:cTn>
-                              </p:par>
-                            </p:childTnLst>
-                          </p:cTn>
-                        </p:par>
-                      </p:childTnLst>
-                    </p:cTn>
-                  </p:par>
-                </p:childTnLst>
-              </p:cTn>
-              <p:prevCondLst>
-                <p:cond evt="onPrev" delay="0">
-                  <p:tgtEl>
-                    <p:sldTgt/>
-                  </p:tgtEl>
-                </p:cond>
-              </p:prevCondLst>
-              <p:nextCondLst>
-                <p:cond evt="onNext" delay="0">
-                  <p:tgtEl>
-                    <p:sldTgt/>
-                  </p:tgtEl>
-                </p:cond>
-              </p:nextCondLst>
-            </p:seq>
-          </p:childTnLst>
-        </p:cTn>
-      </p:par>
-    </p:tnLst>
-    <p:bldLst>
-      <p:bldP spid="9" grpId="0" animBg="1"/>
-      <p:bldP spid="3" grpId="0" animBg="1"/>
-      <p:bldP spid="4" grpId="0" animBg="1"/>
-      <p:bldP spid="16" grpId="0"/>
-      <p:bldP spid="17" grpId="0"/>
-    </p:bldLst>
-  </p:timing>
-</p:sld>
-</file>
-
-<file path=ppt/slides/slide7.xml><?xml version="1.0" encoding="utf-8"?>
-<p:sld xmlns:a="http://schemas.openxmlformats.org/drawingml/2006/main" xmlns:r="http://schemas.openxmlformats.org/officeDocument/2006/relationships" xmlns:p="http://schemas.openxmlformats.org/presentationml/2006/main">
-  <p:cSld>
-    <p:spTree>
-      <p:nvGrpSpPr>
-        <p:cNvPr id="1" name=""/>
-        <p:cNvGrpSpPr/>
-        <p:nvPr/>
-      </p:nvGrpSpPr>
-      <p:grpSpPr>
-        <a:xfrm>
-          <a:off x="0" y="0"/>
-          <a:ext cx="0" cy="0"/>
-          <a:chOff x="0" y="0"/>
-          <a:chExt cx="0" cy="0"/>
-        </a:xfrm>
-      </p:grpSpPr>
-      <p:pic>
-        <p:nvPicPr>
-          <p:cNvPr id="5" name="Image 4">
-            <a:extLst>
-              <a:ext uri="{FF2B5EF4-FFF2-40B4-BE49-F238E27FC236}">
-                <a16:creationId xmlns:a16="http://schemas.microsoft.com/office/drawing/2014/main" id="{EC33B3A8-14F8-BC32-D165-8E5664CB5025}"/>
-              </a:ext>
-            </a:extLst>
-          </p:cNvPr>
-          <p:cNvPicPr>
-            <a:picLocks noGrp="1" noRot="1" noChangeAspect="1" noMove="1" noResize="1" noEditPoints="1" noAdjustHandles="1" noChangeArrowheads="1" noChangeShapeType="1" noCrop="1"/>
-          </p:cNvPicPr>
-          <p:nvPr/>
-        </p:nvPicPr>
-        <p:blipFill rotWithShape="1">
-          <a:blip r:embed="rId2">
-            <a:extLst>
-              <a:ext uri="{28A0092B-C50C-407E-A947-70E740481C1C}">
-                <a14:useLocalDpi xmlns:a14="http://schemas.microsoft.com/office/drawing/2010/main" val="0"/>
-              </a:ext>
-            </a:extLst>
-          </a:blip>
-          <a:srcRect/>
-          <a:stretch/>
-        </p:blipFill>
-        <p:spPr>
-          <a:xfrm>
-            <a:off x="-3047" y="10"/>
-            <a:ext cx="12191999" cy="6857990"/>
-          </a:xfrm>
-          <a:prstGeom prst="rect">
-            <a:avLst/>
-          </a:prstGeom>
-        </p:spPr>
-      </p:pic>
-      <p:sp>
-        <p:nvSpPr>
-          <p:cNvPr id="2" name="Titre 1">
-            <a:extLst>
-              <a:ext uri="{FF2B5EF4-FFF2-40B4-BE49-F238E27FC236}">
-                <a16:creationId xmlns:a16="http://schemas.microsoft.com/office/drawing/2014/main" id="{6C7DAD02-B469-E9EF-B4D5-EC9AD3F3ECCB}"/>
-              </a:ext>
-            </a:extLst>
-          </p:cNvPr>
-          <p:cNvSpPr txBox="1">
-            <a:spLocks/>
-          </p:cNvSpPr>
-          <p:nvPr/>
-        </p:nvSpPr>
-        <p:spPr>
-          <a:xfrm>
-            <a:off x="838200" y="365125"/>
-            <a:ext cx="10515600" cy="1325563"/>
-          </a:xfrm>
-          <a:prstGeom prst="rect">
-            <a:avLst/>
-          </a:prstGeom>
-        </p:spPr>
-        <p:txBody>
-          <a:bodyPr vert="horz" lIns="91440" tIns="45720" rIns="91440" bIns="45720" rtlCol="0" anchor="b">
-            <a:normAutofit/>
-          </a:bodyPr>
-          <a:lstStyle>
-            <a:lvl1pPr algn="ctr" defTabSz="914400" rtl="0" eaLnBrk="1" latinLnBrk="0" hangingPunct="1">
-              <a:lnSpc>
-                <a:spcPct val="90000"/>
-              </a:lnSpc>
-              <a:spcBef>
-                <a:spcPct val="0"/>
-              </a:spcBef>
-              <a:buNone/>
-              <a:defRPr sz="6000" kern="1200">
-                <a:solidFill>
-                  <a:schemeClr val="tx1"/>
-                </a:solidFill>
-                <a:latin typeface="+mj-lt"/>
-                <a:ea typeface="+mj-ea"/>
-                <a:cs typeface="+mj-cs"/>
-              </a:defRPr>
-            </a:lvl1pPr>
-          </a:lstStyle>
-          <a:p>
-            <a:r>
-              <a:rPr lang="fr-FR" sz="5400" dirty="0">
-                <a:ln w="38100">
-                  <a:solidFill>
-                    <a:schemeClr val="tx1"/>
-                  </a:solidFill>
-                </a:ln>
-                <a:solidFill>
-                  <a:srgbClr val="FF0000"/>
-                </a:solidFill>
-                <a:latin typeface="Open Sans ExtraBold" panose="020B0906030804020204" pitchFamily="34" charset="0"/>
-                <a:ea typeface="Open Sans ExtraBold" panose="020B0906030804020204" pitchFamily="34" charset="0"/>
-                <a:cs typeface="Open Sans ExtraBold" panose="020B0906030804020204" pitchFamily="34" charset="0"/>
-              </a:rPr>
               <a:t>Machines</a:t>
             </a:r>
             <a:endParaRPr lang="fr-BE" sz="5400" dirty="0">
@@ -23817,6 +22324,164 @@
           </a:p>
         </p:txBody>
       </p:sp>
+      <p:sp>
+        <p:nvSpPr>
+          <p:cNvPr id="3" name="Titre 1">
+            <a:extLst>
+              <a:ext uri="{FF2B5EF4-FFF2-40B4-BE49-F238E27FC236}">
+                <a16:creationId xmlns:a16="http://schemas.microsoft.com/office/drawing/2014/main" id="{9DBD747B-2513-5A9A-5495-57348BEBD6AD}"/>
+              </a:ext>
+            </a:extLst>
+          </p:cNvPr>
+          <p:cNvSpPr txBox="1">
+            <a:spLocks/>
+          </p:cNvSpPr>
+          <p:nvPr/>
+        </p:nvSpPr>
+        <p:spPr>
+          <a:xfrm>
+            <a:off x="1512325" y="2072131"/>
+            <a:ext cx="2959052" cy="1325563"/>
+          </a:xfrm>
+          <a:prstGeom prst="rect">
+            <a:avLst/>
+          </a:prstGeom>
+        </p:spPr>
+        <p:txBody>
+          <a:bodyPr vert="horz" lIns="91440" tIns="45720" rIns="91440" bIns="45720" rtlCol="0" anchor="b">
+            <a:normAutofit/>
+          </a:bodyPr>
+          <a:lstStyle>
+            <a:lvl1pPr algn="ctr" defTabSz="914400" rtl="0" eaLnBrk="1" latinLnBrk="0" hangingPunct="1">
+              <a:lnSpc>
+                <a:spcPct val="90000"/>
+              </a:lnSpc>
+              <a:spcBef>
+                <a:spcPct val="0"/>
+              </a:spcBef>
+              <a:buNone/>
+              <a:defRPr sz="6000" kern="1200">
+                <a:solidFill>
+                  <a:schemeClr val="tx1"/>
+                </a:solidFill>
+                <a:latin typeface="+mj-lt"/>
+                <a:ea typeface="+mj-ea"/>
+                <a:cs typeface="+mj-cs"/>
+              </a:defRPr>
+            </a:lvl1pPr>
+          </a:lstStyle>
+          <a:p>
+            <a:r>
+              <a:rPr lang="fr-FR" sz="3200" dirty="0">
+                <a:ln w="38100">
+                  <a:solidFill>
+                    <a:schemeClr val="tx1"/>
+                  </a:solidFill>
+                </a:ln>
+                <a:solidFill>
+                  <a:srgbClr val="FFC000"/>
+                </a:solidFill>
+                <a:latin typeface="Open Sans ExtraBold" panose="020B0906030804020204" pitchFamily="34" charset="0"/>
+                <a:ea typeface="Open Sans ExtraBold" panose="020B0906030804020204" pitchFamily="34" charset="0"/>
+                <a:cs typeface="Open Sans ExtraBold" panose="020B0906030804020204" pitchFamily="34" charset="0"/>
+              </a:rPr>
+              <a:t>Routeur</a:t>
+            </a:r>
+            <a:endParaRPr lang="fr-BE" sz="3200" dirty="0">
+              <a:ln w="38100">
+                <a:solidFill>
+                  <a:schemeClr val="tx1"/>
+                </a:solidFill>
+              </a:ln>
+              <a:solidFill>
+                <a:srgbClr val="FFC000"/>
+              </a:solidFill>
+              <a:latin typeface="Open Sans ExtraBold" panose="020B0906030804020204" pitchFamily="34" charset="0"/>
+              <a:ea typeface="Open Sans ExtraBold" panose="020B0906030804020204" pitchFamily="34" charset="0"/>
+              <a:cs typeface="Open Sans ExtraBold" panose="020B0906030804020204" pitchFamily="34" charset="0"/>
+            </a:endParaRPr>
+          </a:p>
+        </p:txBody>
+      </p:sp>
+      <p:sp>
+        <p:nvSpPr>
+          <p:cNvPr id="4" name="Titre 1">
+            <a:extLst>
+              <a:ext uri="{FF2B5EF4-FFF2-40B4-BE49-F238E27FC236}">
+                <a16:creationId xmlns:a16="http://schemas.microsoft.com/office/drawing/2014/main" id="{C205C13F-3A16-A726-7FE7-9DA2F0E3FE38}"/>
+              </a:ext>
+            </a:extLst>
+          </p:cNvPr>
+          <p:cNvSpPr txBox="1">
+            <a:spLocks/>
+          </p:cNvSpPr>
+          <p:nvPr/>
+        </p:nvSpPr>
+        <p:spPr>
+          <a:xfrm>
+            <a:off x="7720622" y="2103437"/>
+            <a:ext cx="2959052" cy="1325563"/>
+          </a:xfrm>
+          <a:prstGeom prst="rect">
+            <a:avLst/>
+          </a:prstGeom>
+        </p:spPr>
+        <p:txBody>
+          <a:bodyPr vert="horz" lIns="91440" tIns="45720" rIns="91440" bIns="45720" rtlCol="0" anchor="b">
+            <a:normAutofit/>
+          </a:bodyPr>
+          <a:lstStyle>
+            <a:lvl1pPr algn="ctr" defTabSz="914400" rtl="0" eaLnBrk="1" latinLnBrk="0" hangingPunct="1">
+              <a:lnSpc>
+                <a:spcPct val="90000"/>
+              </a:lnSpc>
+              <a:spcBef>
+                <a:spcPct val="0"/>
+              </a:spcBef>
+              <a:buNone/>
+              <a:defRPr sz="6000" kern="1200">
+                <a:solidFill>
+                  <a:schemeClr val="tx1"/>
+                </a:solidFill>
+                <a:latin typeface="+mj-lt"/>
+                <a:ea typeface="+mj-ea"/>
+                <a:cs typeface="+mj-cs"/>
+              </a:defRPr>
+            </a:lvl1pPr>
+          </a:lstStyle>
+          <a:p>
+            <a:r>
+              <a:rPr lang="fr-FR" sz="3200" dirty="0">
+                <a:ln w="38100">
+                  <a:solidFill>
+                    <a:schemeClr val="tx1"/>
+                  </a:solidFill>
+                </a:ln>
+                <a:solidFill>
+                  <a:srgbClr val="FFC000"/>
+                </a:solidFill>
+                <a:latin typeface="Open Sans ExtraBold" panose="020B0906030804020204" pitchFamily="34" charset="0"/>
+                <a:ea typeface="Open Sans ExtraBold" panose="020B0906030804020204" pitchFamily="34" charset="0"/>
+                <a:cs typeface="Open Sans ExtraBold" panose="020B0906030804020204" pitchFamily="34" charset="0"/>
+              </a:rPr>
+              <a:t>Switch</a:t>
+            </a:r>
+            <a:endParaRPr lang="fr-BE" sz="3200" dirty="0">
+              <a:ln w="38100">
+                <a:solidFill>
+                  <a:schemeClr val="tx1"/>
+                </a:solidFill>
+              </a:ln>
+              <a:solidFill>
+                <a:srgbClr val="FFC000"/>
+              </a:solidFill>
+              <a:latin typeface="Open Sans ExtraBold" panose="020B0906030804020204" pitchFamily="34" charset="0"/>
+              <a:ea typeface="Open Sans ExtraBold" panose="020B0906030804020204" pitchFamily="34" charset="0"/>
+              <a:cs typeface="Open Sans ExtraBold" panose="020B0906030804020204" pitchFamily="34" charset="0"/>
+            </a:endParaRPr>
+          </a:p>
+        </p:txBody>
+      </p:sp>
     </p:spTree>
     <p:extLst>
       <p:ext uri="{BB962C8B-B14F-4D97-AF65-F5344CB8AC3E}">
@@ -23842,7 +22507,7 @@
 </p:sld>
 </file>
 
-<file path=ppt/slides/slide8.xml><?xml version="1.0" encoding="utf-8"?>
+<file path=ppt/slides/slide7.xml><?xml version="1.0" encoding="utf-8"?>
 <p:sld xmlns:a="http://schemas.openxmlformats.org/drawingml/2006/main" xmlns:r="http://schemas.openxmlformats.org/officeDocument/2006/relationships" xmlns:p="http://schemas.openxmlformats.org/presentationml/2006/main">
   <p:cSld>
     <p:spTree>
@@ -28553,7 +27218,7 @@
 </p:sld>
 </file>
 
-<file path=ppt/slides/slide9.xml><?xml version="1.0" encoding="utf-8"?>
+<file path=ppt/slides/slide8.xml><?xml version="1.0" encoding="utf-8"?>
 <p:sld xmlns:a="http://schemas.openxmlformats.org/drawingml/2006/main" xmlns:r="http://schemas.openxmlformats.org/officeDocument/2006/relationships" xmlns:p="http://schemas.openxmlformats.org/presentationml/2006/main">
   <p:cSld>
     <p:spTree>
@@ -32986,13 +31651,13 @@
   <p:clrMapOvr>
     <a:masterClrMapping/>
   </p:clrMapOvr>
-  <mc:AlternateContent xmlns:mc="http://schemas.openxmlformats.org/markup-compatibility/2006">
-    <mc:Choice xmlns:p159="http://schemas.microsoft.com/office/powerpoint/2015/09/main" Requires="p159">
+  <mc:AlternateContent xmlns:mc="http://schemas.openxmlformats.org/markup-compatibility/2006" xmlns:p159="http://schemas.microsoft.com/office/powerpoint/2015/09/main">
+    <mc:Choice Requires="p159">
       <p:transition xmlns:p14="http://schemas.microsoft.com/office/powerpoint/2010/main" spd="slow" p14:dur="2000">
         <p159:morph option="byObject"/>
       </p:transition>
     </mc:Choice>
-    <mc:Fallback>
+    <mc:Fallback xmlns="">
       <p:transition spd="slow">
         <p:fade/>
       </p:transition>
@@ -35389,6 +34054,579 @@
       <p:bldP spid="65" grpId="0" animBg="1"/>
     </p:bldLst>
   </p:timing>
+</p:sld>
+</file>
+
+<file path=ppt/slides/slide9.xml><?xml version="1.0" encoding="utf-8"?>
+<p:sld xmlns:a="http://schemas.openxmlformats.org/drawingml/2006/main" xmlns:r="http://schemas.openxmlformats.org/officeDocument/2006/relationships" xmlns:p="http://schemas.openxmlformats.org/presentationml/2006/main">
+  <p:cSld>
+    <p:spTree>
+      <p:nvGrpSpPr>
+        <p:cNvPr id="1" name=""/>
+        <p:cNvGrpSpPr/>
+        <p:nvPr/>
+      </p:nvGrpSpPr>
+      <p:grpSpPr>
+        <a:xfrm>
+          <a:off x="0" y="0"/>
+          <a:ext cx="0" cy="0"/>
+          <a:chOff x="0" y="0"/>
+          <a:chExt cx="0" cy="0"/>
+        </a:xfrm>
+      </p:grpSpPr>
+      <p:pic>
+        <p:nvPicPr>
+          <p:cNvPr id="5" name="Image 4">
+            <a:extLst>
+              <a:ext uri="{FF2B5EF4-FFF2-40B4-BE49-F238E27FC236}">
+                <a16:creationId xmlns:a16="http://schemas.microsoft.com/office/drawing/2014/main" id="{EC33B3A8-14F8-BC32-D165-8E5664CB5025}"/>
+              </a:ext>
+            </a:extLst>
+          </p:cNvPr>
+          <p:cNvPicPr>
+            <a:picLocks noGrp="1" noRot="1" noChangeAspect="1" noMove="1" noResize="1" noEditPoints="1" noAdjustHandles="1" noChangeArrowheads="1" noChangeShapeType="1" noCrop="1"/>
+          </p:cNvPicPr>
+          <p:nvPr/>
+        </p:nvPicPr>
+        <p:blipFill rotWithShape="1">
+          <a:blip r:embed="rId2">
+            <a:extLst>
+              <a:ext uri="{28A0092B-C50C-407E-A947-70E740481C1C}">
+                <a14:useLocalDpi xmlns:a14="http://schemas.microsoft.com/office/drawing/2010/main" val="0"/>
+              </a:ext>
+            </a:extLst>
+          </a:blip>
+          <a:srcRect/>
+          <a:stretch/>
+        </p:blipFill>
+        <p:spPr>
+          <a:xfrm>
+            <a:off x="-3047" y="10"/>
+            <a:ext cx="12191999" cy="6857990"/>
+          </a:xfrm>
+          <a:prstGeom prst="rect">
+            <a:avLst/>
+          </a:prstGeom>
+        </p:spPr>
+      </p:pic>
+      <p:sp>
+        <p:nvSpPr>
+          <p:cNvPr id="2" name="Titre 1">
+            <a:extLst>
+              <a:ext uri="{FF2B5EF4-FFF2-40B4-BE49-F238E27FC236}">
+                <a16:creationId xmlns:a16="http://schemas.microsoft.com/office/drawing/2014/main" id="{6C7DAD02-B469-E9EF-B4D5-EC9AD3F3ECCB}"/>
+              </a:ext>
+            </a:extLst>
+          </p:cNvPr>
+          <p:cNvSpPr txBox="1">
+            <a:spLocks/>
+          </p:cNvSpPr>
+          <p:nvPr/>
+        </p:nvSpPr>
+        <p:spPr>
+          <a:xfrm>
+            <a:off x="1346200" y="484836"/>
+            <a:ext cx="10515600" cy="1325563"/>
+          </a:xfrm>
+          <a:prstGeom prst="rect">
+            <a:avLst/>
+          </a:prstGeom>
+        </p:spPr>
+        <p:txBody>
+          <a:bodyPr vert="horz" lIns="91440" tIns="45720" rIns="91440" bIns="45720" rtlCol="0" anchor="b">
+            <a:normAutofit fontScale="92500" lnSpcReduction="10000"/>
+          </a:bodyPr>
+          <a:lstStyle>
+            <a:lvl1pPr algn="ctr" defTabSz="914400" rtl="0" eaLnBrk="1" latinLnBrk="0" hangingPunct="1">
+              <a:lnSpc>
+                <a:spcPct val="90000"/>
+              </a:lnSpc>
+              <a:spcBef>
+                <a:spcPct val="0"/>
+              </a:spcBef>
+              <a:buNone/>
+              <a:defRPr sz="6000" kern="1200">
+                <a:solidFill>
+                  <a:schemeClr val="tx1"/>
+                </a:solidFill>
+                <a:latin typeface="+mj-lt"/>
+                <a:ea typeface="+mj-ea"/>
+                <a:cs typeface="+mj-cs"/>
+              </a:defRPr>
+            </a:lvl1pPr>
+          </a:lstStyle>
+          <a:p>
+            <a:r>
+              <a:rPr lang="fr-FR" sz="5400" dirty="0">
+                <a:ln w="38100">
+                  <a:solidFill>
+                    <a:schemeClr val="tx1"/>
+                  </a:solidFill>
+                </a:ln>
+                <a:solidFill>
+                  <a:srgbClr val="FF0000"/>
+                </a:solidFill>
+                <a:latin typeface="Open Sans ExtraBold" panose="020B0906030804020204" pitchFamily="34" charset="0"/>
+                <a:ea typeface="Open Sans ExtraBold" panose="020B0906030804020204" pitchFamily="34" charset="0"/>
+                <a:cs typeface="Open Sans ExtraBold" panose="020B0906030804020204" pitchFamily="34" charset="0"/>
+              </a:rPr>
+              <a:t>ARP</a:t>
+            </a:r>
+          </a:p>
+          <a:p>
+            <a:r>
+              <a:rPr lang="fr-FR" sz="5400" dirty="0" err="1">
+                <a:ln w="38100">
+                  <a:solidFill>
+                    <a:schemeClr val="tx1"/>
+                  </a:solidFill>
+                </a:ln>
+                <a:solidFill>
+                  <a:srgbClr val="FF0000"/>
+                </a:solidFill>
+                <a:latin typeface="Open Sans ExtraBold" panose="020B0906030804020204" pitchFamily="34" charset="0"/>
+                <a:ea typeface="Open Sans ExtraBold" panose="020B0906030804020204" pitchFamily="34" charset="0"/>
+                <a:cs typeface="Open Sans ExtraBold" panose="020B0906030804020204" pitchFamily="34" charset="0"/>
+              </a:rPr>
+              <a:t>Address</a:t>
+            </a:r>
+            <a:r>
+              <a:rPr lang="fr-FR" sz="5400" dirty="0">
+                <a:ln w="38100">
+                  <a:solidFill>
+                    <a:schemeClr val="tx1"/>
+                  </a:solidFill>
+                </a:ln>
+                <a:solidFill>
+                  <a:srgbClr val="FF0000"/>
+                </a:solidFill>
+                <a:latin typeface="Open Sans ExtraBold" panose="020B0906030804020204" pitchFamily="34" charset="0"/>
+                <a:ea typeface="Open Sans ExtraBold" panose="020B0906030804020204" pitchFamily="34" charset="0"/>
+                <a:cs typeface="Open Sans ExtraBold" panose="020B0906030804020204" pitchFamily="34" charset="0"/>
+              </a:rPr>
+              <a:t> </a:t>
+            </a:r>
+            <a:r>
+              <a:rPr lang="fr-FR" sz="5400" dirty="0" err="1">
+                <a:ln w="38100">
+                  <a:solidFill>
+                    <a:schemeClr val="tx1"/>
+                  </a:solidFill>
+                </a:ln>
+                <a:solidFill>
+                  <a:srgbClr val="FF0000"/>
+                </a:solidFill>
+                <a:latin typeface="Open Sans ExtraBold" panose="020B0906030804020204" pitchFamily="34" charset="0"/>
+                <a:ea typeface="Open Sans ExtraBold" panose="020B0906030804020204" pitchFamily="34" charset="0"/>
+                <a:cs typeface="Open Sans ExtraBold" panose="020B0906030804020204" pitchFamily="34" charset="0"/>
+              </a:rPr>
+              <a:t>Resolution</a:t>
+            </a:r>
+            <a:r>
+              <a:rPr lang="fr-FR" sz="5400" dirty="0">
+                <a:ln w="38100">
+                  <a:solidFill>
+                    <a:schemeClr val="tx1"/>
+                  </a:solidFill>
+                </a:ln>
+                <a:solidFill>
+                  <a:srgbClr val="FF0000"/>
+                </a:solidFill>
+                <a:latin typeface="Open Sans ExtraBold" panose="020B0906030804020204" pitchFamily="34" charset="0"/>
+                <a:ea typeface="Open Sans ExtraBold" panose="020B0906030804020204" pitchFamily="34" charset="0"/>
+                <a:cs typeface="Open Sans ExtraBold" panose="020B0906030804020204" pitchFamily="34" charset="0"/>
+              </a:rPr>
+              <a:t> Protocol</a:t>
+            </a:r>
+            <a:endParaRPr lang="fr-BE" sz="5400" dirty="0">
+              <a:ln w="38100">
+                <a:solidFill>
+                  <a:schemeClr val="tx1"/>
+                </a:solidFill>
+              </a:ln>
+              <a:solidFill>
+                <a:srgbClr val="FF0000"/>
+              </a:solidFill>
+              <a:latin typeface="Open Sans ExtraBold" panose="020B0906030804020204" pitchFamily="34" charset="0"/>
+              <a:ea typeface="Open Sans ExtraBold" panose="020B0906030804020204" pitchFamily="34" charset="0"/>
+              <a:cs typeface="Open Sans ExtraBold" panose="020B0906030804020204" pitchFamily="34" charset="0"/>
+            </a:endParaRPr>
+          </a:p>
+        </p:txBody>
+      </p:sp>
+      <p:sp>
+        <p:nvSpPr>
+          <p:cNvPr id="8" name="Sous-titre 10">
+            <a:extLst>
+              <a:ext uri="{FF2B5EF4-FFF2-40B4-BE49-F238E27FC236}">
+                <a16:creationId xmlns:a16="http://schemas.microsoft.com/office/drawing/2014/main" id="{D969A3C9-3CAC-705D-DD59-BD35327CB7B0}"/>
+              </a:ext>
+            </a:extLst>
+          </p:cNvPr>
+          <p:cNvSpPr txBox="1">
+            <a:spLocks/>
+          </p:cNvSpPr>
+          <p:nvPr/>
+        </p:nvSpPr>
+        <p:spPr>
+          <a:xfrm>
+            <a:off x="838200" y="2618581"/>
+            <a:ext cx="10734964" cy="3431237"/>
+          </a:xfrm>
+          <a:prstGeom prst="rect">
+            <a:avLst/>
+          </a:prstGeom>
+        </p:spPr>
+        <p:txBody>
+          <a:bodyPr vert="horz" lIns="91440" tIns="45720" rIns="91440" bIns="45720" rtlCol="0">
+            <a:normAutofit/>
+          </a:bodyPr>
+          <a:lstStyle>
+            <a:lvl1pPr marL="0" indent="0" algn="ctr" defTabSz="914400" rtl="0" eaLnBrk="1" latinLnBrk="0" hangingPunct="1">
+              <a:lnSpc>
+                <a:spcPct val="90000"/>
+              </a:lnSpc>
+              <a:spcBef>
+                <a:spcPts val="1000"/>
+              </a:spcBef>
+              <a:buFont typeface="Arial" panose="020B0604020202020204" pitchFamily="34" charset="0"/>
+              <a:buNone/>
+              <a:defRPr sz="2400" kern="1200">
+                <a:solidFill>
+                  <a:schemeClr val="tx1"/>
+                </a:solidFill>
+                <a:latin typeface="+mn-lt"/>
+                <a:ea typeface="+mn-ea"/>
+                <a:cs typeface="+mn-cs"/>
+              </a:defRPr>
+            </a:lvl1pPr>
+            <a:lvl2pPr marL="457200" indent="0" algn="ctr" defTabSz="914400" rtl="0" eaLnBrk="1" latinLnBrk="0" hangingPunct="1">
+              <a:lnSpc>
+                <a:spcPct val="90000"/>
+              </a:lnSpc>
+              <a:spcBef>
+                <a:spcPts val="500"/>
+              </a:spcBef>
+              <a:buFont typeface="Arial" panose="020B0604020202020204" pitchFamily="34" charset="0"/>
+              <a:buNone/>
+              <a:defRPr sz="2000" kern="1200">
+                <a:solidFill>
+                  <a:schemeClr val="tx1"/>
+                </a:solidFill>
+                <a:latin typeface="+mn-lt"/>
+                <a:ea typeface="+mn-ea"/>
+                <a:cs typeface="+mn-cs"/>
+              </a:defRPr>
+            </a:lvl2pPr>
+            <a:lvl3pPr marL="914400" indent="0" algn="ctr" defTabSz="914400" rtl="0" eaLnBrk="1" latinLnBrk="0" hangingPunct="1">
+              <a:lnSpc>
+                <a:spcPct val="90000"/>
+              </a:lnSpc>
+              <a:spcBef>
+                <a:spcPts val="500"/>
+              </a:spcBef>
+              <a:buFont typeface="Arial" panose="020B0604020202020204" pitchFamily="34" charset="0"/>
+              <a:buNone/>
+              <a:defRPr sz="1800" kern="1200">
+                <a:solidFill>
+                  <a:schemeClr val="tx1"/>
+                </a:solidFill>
+                <a:latin typeface="+mn-lt"/>
+                <a:ea typeface="+mn-ea"/>
+                <a:cs typeface="+mn-cs"/>
+              </a:defRPr>
+            </a:lvl3pPr>
+            <a:lvl4pPr marL="1371600" indent="0" algn="ctr" defTabSz="914400" rtl="0" eaLnBrk="1" latinLnBrk="0" hangingPunct="1">
+              <a:lnSpc>
+                <a:spcPct val="90000"/>
+              </a:lnSpc>
+              <a:spcBef>
+                <a:spcPts val="500"/>
+              </a:spcBef>
+              <a:buFont typeface="Arial" panose="020B0604020202020204" pitchFamily="34" charset="0"/>
+              <a:buNone/>
+              <a:defRPr sz="1600" kern="1200">
+                <a:solidFill>
+                  <a:schemeClr val="tx1"/>
+                </a:solidFill>
+                <a:latin typeface="+mn-lt"/>
+                <a:ea typeface="+mn-ea"/>
+                <a:cs typeface="+mn-cs"/>
+              </a:defRPr>
+            </a:lvl4pPr>
+            <a:lvl5pPr marL="1828800" indent="0" algn="ctr" defTabSz="914400" rtl="0" eaLnBrk="1" latinLnBrk="0" hangingPunct="1">
+              <a:lnSpc>
+                <a:spcPct val="90000"/>
+              </a:lnSpc>
+              <a:spcBef>
+                <a:spcPts val="500"/>
+              </a:spcBef>
+              <a:buFont typeface="Arial" panose="020B0604020202020204" pitchFamily="34" charset="0"/>
+              <a:buNone/>
+              <a:defRPr sz="1600" kern="1200">
+                <a:solidFill>
+                  <a:schemeClr val="tx1"/>
+                </a:solidFill>
+                <a:latin typeface="+mn-lt"/>
+                <a:ea typeface="+mn-ea"/>
+                <a:cs typeface="+mn-cs"/>
+              </a:defRPr>
+            </a:lvl5pPr>
+            <a:lvl6pPr marL="2286000" indent="0" algn="ctr" defTabSz="914400" rtl="0" eaLnBrk="1" latinLnBrk="0" hangingPunct="1">
+              <a:lnSpc>
+                <a:spcPct val="90000"/>
+              </a:lnSpc>
+              <a:spcBef>
+                <a:spcPts val="500"/>
+              </a:spcBef>
+              <a:buFont typeface="Arial" panose="020B0604020202020204" pitchFamily="34" charset="0"/>
+              <a:buNone/>
+              <a:defRPr sz="1600" kern="1200">
+                <a:solidFill>
+                  <a:schemeClr val="tx1"/>
+                </a:solidFill>
+                <a:latin typeface="+mn-lt"/>
+                <a:ea typeface="+mn-ea"/>
+                <a:cs typeface="+mn-cs"/>
+              </a:defRPr>
+            </a:lvl6pPr>
+            <a:lvl7pPr marL="2743200" indent="0" algn="ctr" defTabSz="914400" rtl="0" eaLnBrk="1" latinLnBrk="0" hangingPunct="1">
+              <a:lnSpc>
+                <a:spcPct val="90000"/>
+              </a:lnSpc>
+              <a:spcBef>
+                <a:spcPts val="500"/>
+              </a:spcBef>
+              <a:buFont typeface="Arial" panose="020B0604020202020204" pitchFamily="34" charset="0"/>
+              <a:buNone/>
+              <a:defRPr sz="1600" kern="1200">
+                <a:solidFill>
+                  <a:schemeClr val="tx1"/>
+                </a:solidFill>
+                <a:latin typeface="+mn-lt"/>
+                <a:ea typeface="+mn-ea"/>
+                <a:cs typeface="+mn-cs"/>
+              </a:defRPr>
+            </a:lvl7pPr>
+            <a:lvl8pPr marL="3200400" indent="0" algn="ctr" defTabSz="914400" rtl="0" eaLnBrk="1" latinLnBrk="0" hangingPunct="1">
+              <a:lnSpc>
+                <a:spcPct val="90000"/>
+              </a:lnSpc>
+              <a:spcBef>
+                <a:spcPts val="500"/>
+              </a:spcBef>
+              <a:buFont typeface="Arial" panose="020B0604020202020204" pitchFamily="34" charset="0"/>
+              <a:buNone/>
+              <a:defRPr sz="1600" kern="1200">
+                <a:solidFill>
+                  <a:schemeClr val="tx1"/>
+                </a:solidFill>
+                <a:latin typeface="+mn-lt"/>
+                <a:ea typeface="+mn-ea"/>
+                <a:cs typeface="+mn-cs"/>
+              </a:defRPr>
+            </a:lvl8pPr>
+            <a:lvl9pPr marL="3657600" indent="0" algn="ctr" defTabSz="914400" rtl="0" eaLnBrk="1" latinLnBrk="0" hangingPunct="1">
+              <a:lnSpc>
+                <a:spcPct val="90000"/>
+              </a:lnSpc>
+              <a:spcBef>
+                <a:spcPts val="500"/>
+              </a:spcBef>
+              <a:buFont typeface="Arial" panose="020B0604020202020204" pitchFamily="34" charset="0"/>
+              <a:buNone/>
+              <a:defRPr sz="1600" kern="1200">
+                <a:solidFill>
+                  <a:schemeClr val="tx1"/>
+                </a:solidFill>
+                <a:latin typeface="+mn-lt"/>
+                <a:ea typeface="+mn-ea"/>
+                <a:cs typeface="+mn-cs"/>
+              </a:defRPr>
+            </a:lvl9pPr>
+          </a:lstStyle>
+          <a:p>
+            <a:pPr marL="342900" indent="-342900" algn="l">
+              <a:buFont typeface="Arial" panose="020B0604020202020204" pitchFamily="34" charset="0"/>
+              <a:buChar char="•"/>
+            </a:pPr>
+            <a:r>
+              <a:rPr lang="fr-FR" sz="2800" dirty="0">
+                <a:ln w="28575">
+                  <a:solidFill>
+                    <a:sysClr val="windowText" lastClr="000000"/>
+                  </a:solidFill>
+                </a:ln>
+                <a:solidFill>
+                  <a:schemeClr val="bg1"/>
+                </a:solidFill>
+                <a:latin typeface="Open Sans ExtraBold" panose="020B0906030804020204" pitchFamily="34" charset="0"/>
+                <a:ea typeface="Open Sans ExtraBold" panose="020B0906030804020204" pitchFamily="34" charset="0"/>
+                <a:cs typeface="Open Sans ExtraBold" panose="020B0906030804020204" pitchFamily="34" charset="0"/>
+              </a:rPr>
+              <a:t>Permet d’obtenir la MAC associée à une IP</a:t>
+            </a:r>
+          </a:p>
+          <a:p>
+            <a:pPr marL="342900" indent="-342900" algn="l">
+              <a:buFont typeface="Arial" panose="020B0604020202020204" pitchFamily="34" charset="0"/>
+              <a:buChar char="•"/>
+            </a:pPr>
+            <a:r>
+              <a:rPr lang="fr-FR" sz="2800" dirty="0">
+                <a:ln w="28575">
+                  <a:solidFill>
+                    <a:sysClr val="windowText" lastClr="000000"/>
+                  </a:solidFill>
+                </a:ln>
+                <a:solidFill>
+                  <a:schemeClr val="bg1"/>
+                </a:solidFill>
+                <a:latin typeface="Open Sans ExtraBold" panose="020B0906030804020204" pitchFamily="34" charset="0"/>
+                <a:ea typeface="Open Sans ExtraBold" panose="020B0906030804020204" pitchFamily="34" charset="0"/>
+                <a:cs typeface="Open Sans ExtraBold" panose="020B0906030804020204" pitchFamily="34" charset="0"/>
+              </a:rPr>
+              <a:t>Requêtes</a:t>
+            </a:r>
+          </a:p>
+          <a:p>
+            <a:pPr marL="914400" lvl="1" indent="-457200" algn="l">
+              <a:buFont typeface="+mj-lt"/>
+              <a:buAutoNum type="arabicPeriod"/>
+            </a:pPr>
+            <a:r>
+              <a:rPr lang="fr-FR" sz="2400" dirty="0" err="1">
+                <a:ln w="28575">
+                  <a:solidFill>
+                    <a:sysClr val="windowText" lastClr="000000"/>
+                  </a:solidFill>
+                </a:ln>
+                <a:solidFill>
+                  <a:schemeClr val="bg1"/>
+                </a:solidFill>
+                <a:latin typeface="Open Sans ExtraBold" panose="020B0906030804020204" pitchFamily="34" charset="0"/>
+                <a:ea typeface="Open Sans ExtraBold" panose="020B0906030804020204" pitchFamily="34" charset="0"/>
+                <a:cs typeface="Open Sans ExtraBold" panose="020B0906030804020204" pitchFamily="34" charset="0"/>
+              </a:rPr>
+              <a:t>Request</a:t>
+            </a:r>
+            <a:r>
+              <a:rPr lang="fr-FR" sz="2400" dirty="0">
+                <a:ln w="28575">
+                  <a:solidFill>
+                    <a:sysClr val="windowText" lastClr="000000"/>
+                  </a:solidFill>
+                </a:ln>
+                <a:solidFill>
+                  <a:schemeClr val="bg1"/>
+                </a:solidFill>
+                <a:latin typeface="Open Sans ExtraBold" panose="020B0906030804020204" pitchFamily="34" charset="0"/>
+                <a:ea typeface="Open Sans ExtraBold" panose="020B0906030804020204" pitchFamily="34" charset="0"/>
+                <a:cs typeface="Open Sans ExtraBold" panose="020B0906030804020204" pitchFamily="34" charset="0"/>
+              </a:rPr>
+              <a:t> (Qui a X.X.X.X ?)</a:t>
+            </a:r>
+          </a:p>
+          <a:p>
+            <a:pPr lvl="2" algn="l"/>
+            <a:r>
+              <a:rPr lang="fr-FR" sz="2200" dirty="0">
+                <a:ln w="28575">
+                  <a:solidFill>
+                    <a:sysClr val="windowText" lastClr="000000"/>
+                  </a:solidFill>
+                </a:ln>
+                <a:solidFill>
+                  <a:schemeClr val="bg1"/>
+                </a:solidFill>
+                <a:latin typeface="Open Sans ExtraBold" panose="020B0906030804020204" pitchFamily="34" charset="0"/>
+                <a:ea typeface="Open Sans ExtraBold" panose="020B0906030804020204" pitchFamily="34" charset="0"/>
+                <a:cs typeface="Open Sans ExtraBold" panose="020B0906030804020204" pitchFamily="34" charset="0"/>
+              </a:rPr>
+              <a:t>Broadcast</a:t>
+            </a:r>
+          </a:p>
+          <a:p>
+            <a:pPr marL="914400" lvl="1" indent="-457200" algn="l">
+              <a:buFont typeface="+mj-lt"/>
+              <a:buAutoNum type="arabicPeriod"/>
+            </a:pPr>
+            <a:r>
+              <a:rPr lang="fr-FR" sz="2400" dirty="0" err="1">
+                <a:ln w="28575">
+                  <a:solidFill>
+                    <a:sysClr val="windowText" lastClr="000000"/>
+                  </a:solidFill>
+                </a:ln>
+                <a:solidFill>
+                  <a:schemeClr val="bg1"/>
+                </a:solidFill>
+                <a:latin typeface="Open Sans ExtraBold" panose="020B0906030804020204" pitchFamily="34" charset="0"/>
+                <a:ea typeface="Open Sans ExtraBold" panose="020B0906030804020204" pitchFamily="34" charset="0"/>
+                <a:cs typeface="Open Sans ExtraBold" panose="020B0906030804020204" pitchFamily="34" charset="0"/>
+              </a:rPr>
+              <a:t>Reply</a:t>
+            </a:r>
+            <a:r>
+              <a:rPr lang="fr-FR" sz="2400" dirty="0">
+                <a:ln w="28575">
+                  <a:solidFill>
+                    <a:sysClr val="windowText" lastClr="000000"/>
+                  </a:solidFill>
+                </a:ln>
+                <a:solidFill>
+                  <a:schemeClr val="bg1"/>
+                </a:solidFill>
+                <a:latin typeface="Open Sans ExtraBold" panose="020B0906030804020204" pitchFamily="34" charset="0"/>
+                <a:ea typeface="Open Sans ExtraBold" panose="020B0906030804020204" pitchFamily="34" charset="0"/>
+                <a:cs typeface="Open Sans ExtraBold" panose="020B0906030804020204" pitchFamily="34" charset="0"/>
+              </a:rPr>
+              <a:t> (C’est moi qui ai X.X.X.X, voici ma MAC: Y:Y:Y:Y:Y:Y)</a:t>
+            </a:r>
+          </a:p>
+          <a:p>
+            <a:pPr lvl="2" algn="l"/>
+            <a:r>
+              <a:rPr lang="fr-FR" sz="2200" dirty="0">
+                <a:ln w="28575">
+                  <a:solidFill>
+                    <a:sysClr val="windowText" lastClr="000000"/>
+                  </a:solidFill>
+                </a:ln>
+                <a:solidFill>
+                  <a:schemeClr val="bg1"/>
+                </a:solidFill>
+                <a:latin typeface="Open Sans ExtraBold" panose="020B0906030804020204" pitchFamily="34" charset="0"/>
+                <a:ea typeface="Open Sans ExtraBold" panose="020B0906030804020204" pitchFamily="34" charset="0"/>
+                <a:cs typeface="Open Sans ExtraBold" panose="020B0906030804020204" pitchFamily="34" charset="0"/>
+              </a:rPr>
+              <a:t>Unicast</a:t>
+            </a:r>
+          </a:p>
+        </p:txBody>
+      </p:sp>
+    </p:spTree>
+    <p:extLst>
+      <p:ext uri="{BB962C8B-B14F-4D97-AF65-F5344CB8AC3E}">
+        <p14:creationId xmlns:p14="http://schemas.microsoft.com/office/powerpoint/2010/main" val="226621067"/>
+      </p:ext>
+    </p:extLst>
+  </p:cSld>
+  <p:clrMapOvr>
+    <a:masterClrMapping/>
+  </p:clrMapOvr>
+  <mc:AlternateContent xmlns:mc="http://schemas.openxmlformats.org/markup-compatibility/2006" xmlns:p159="http://schemas.microsoft.com/office/powerpoint/2015/09/main">
+    <mc:Choice Requires="p159">
+      <p:transition xmlns:p14="http://schemas.microsoft.com/office/powerpoint/2010/main" spd="slow" p14:dur="2000">
+        <p159:morph option="byObject"/>
+      </p:transition>
+    </mc:Choice>
+    <mc:Fallback xmlns="">
+      <p:transition spd="slow">
+        <p:fade/>
+      </p:transition>
+    </mc:Fallback>
+  </mc:AlternateContent>
 </p:sld>
 </file>
 

</xml_diff>